<commit_message>
To transfer work to another workstation
</commit_message>
<xml_diff>
--- a/Fullstack Tutorial.pptx
+++ b/Fullstack Tutorial.pptx
@@ -5,7 +5,7 @@
     <p:sldMasterId id="2147483648" r:id="rId1"/>
   </p:sldMasterIdLst>
   <p:notesMasterIdLst>
-    <p:notesMasterId r:id="rId29"/>
+    <p:notesMasterId r:id="rId33"/>
   </p:notesMasterIdLst>
   <p:sldIdLst>
     <p:sldId id="256" r:id="rId2"/>
@@ -34,7 +34,11 @@
     <p:sldId id="283" r:id="rId25"/>
     <p:sldId id="284" r:id="rId26"/>
     <p:sldId id="285" r:id="rId27"/>
-    <p:sldId id="286" r:id="rId28"/>
+    <p:sldId id="287" r:id="rId28"/>
+    <p:sldId id="288" r:id="rId29"/>
+    <p:sldId id="289" r:id="rId30"/>
+    <p:sldId id="286" r:id="rId31"/>
+    <p:sldId id="290" r:id="rId32"/>
   </p:sldIdLst>
   <p:sldSz cx="12192000" cy="6858000"/>
   <p:notesSz cx="6858000" cy="9144000"/>
@@ -7956,7 +7960,7 @@
         <p:spPr>
           <a:xfrm>
             <a:off x="838200" y="2091670"/>
-            <a:ext cx="10563237" cy="4401205"/>
+            <a:ext cx="10563237" cy="3970318"/>
           </a:xfrm>
           <a:prstGeom prst="rect">
             <a:avLst/>
@@ -8122,14 +8126,6 @@
               </a:rPr>
               <a:t>&gt;</a:t>
             </a:r>
-            <a:endParaRPr lang="en-US" sz="2800" dirty="0">
-              <a:solidFill>
-                <a:srgbClr val="D4D4D4"/>
-              </a:solidFill>
-              <a:latin typeface="Consolas" panose="020B0609020204030204" pitchFamily="49" charset="0"/>
-            </a:endParaRPr>
-          </a:p>
-          <a:p>
             <a:r>
               <a:rPr lang="en-US" sz="2800" dirty="0">
                 <a:solidFill>
@@ -8137,43 +8133,7 @@
                 </a:solidFill>
                 <a:latin typeface="Consolas" panose="020B0609020204030204" pitchFamily="49" charset="0"/>
               </a:rPr>
-              <a:t>    {% block </a:t>
-            </a:r>
-            <a:r>
-              <a:rPr lang="en-US" sz="2800" dirty="0" err="1">
-                <a:solidFill>
-                  <a:srgbClr val="D4D4D4"/>
-                </a:solidFill>
-                <a:latin typeface="Consolas" panose="020B0609020204030204" pitchFamily="49" charset="0"/>
-              </a:rPr>
-              <a:t>head_block</a:t>
-            </a:r>
-            <a:r>
-              <a:rPr lang="en-US" sz="2800" dirty="0">
-                <a:solidFill>
-                  <a:srgbClr val="D4D4D4"/>
-                </a:solidFill>
-                <a:latin typeface="Consolas" panose="020B0609020204030204" pitchFamily="49" charset="0"/>
-              </a:rPr>
-              <a:t> %}{% </a:t>
-            </a:r>
-            <a:r>
-              <a:rPr lang="en-US" sz="2800" dirty="0" err="1">
-                <a:solidFill>
-                  <a:srgbClr val="D4D4D4"/>
-                </a:solidFill>
-                <a:latin typeface="Consolas" panose="020B0609020204030204" pitchFamily="49" charset="0"/>
-              </a:rPr>
-              <a:t>endblock</a:t>
-            </a:r>
-            <a:r>
-              <a:rPr lang="en-US" sz="2800" dirty="0">
-                <a:solidFill>
-                  <a:srgbClr val="D4D4D4"/>
-                </a:solidFill>
-                <a:latin typeface="Consolas" panose="020B0609020204030204" pitchFamily="49" charset="0"/>
-              </a:rPr>
-              <a:t> %}</a:t>
+              <a:t>   </a:t>
             </a:r>
           </a:p>
           <a:p>
@@ -10813,21 +10773,15 @@
           <a:p>
             <a:r>
               <a:rPr lang="en-US" dirty="0"/>
-              <a:t>Add </a:t>
+              <a:t>Edit the head section of base.html to include the required </a:t>
             </a:r>
             <a:r>
               <a:rPr lang="en-US" dirty="0" err="1"/>
-              <a:t>jquery</a:t>
+              <a:t>javascript</a:t>
             </a:r>
             <a:r>
               <a:rPr lang="en-US" dirty="0"/>
-              <a:t> to base.html</a:t>
-            </a:r>
-          </a:p>
-          <a:p>
-            <a:r>
-              <a:rPr lang="en-US" dirty="0"/>
-              <a:t>Add reference to event handler in base.html</a:t>
+              <a:t>.</a:t>
             </a:r>
           </a:p>
         </p:txBody>
@@ -11160,43 +11114,7 @@
                 </a:solidFill>
                 <a:latin typeface="Consolas" panose="020B0609020204030204" pitchFamily="49" charset="0"/>
               </a:rPr>
-              <a:t>  </a:t>
-            </a:r>
-            <a:r>
-              <a:rPr lang="en-US" sz="1800" dirty="0">
-                <a:solidFill>
-                  <a:srgbClr val="9CDCFE"/>
-                </a:solidFill>
-                <a:latin typeface="Consolas" panose="020B0609020204030204" pitchFamily="49" charset="0"/>
-              </a:rPr>
-              <a:t>integrity</a:t>
-            </a:r>
-            <a:r>
-              <a:rPr lang="en-US" sz="1800" dirty="0">
-                <a:solidFill>
-                  <a:srgbClr val="D4D4D4"/>
-                </a:solidFill>
-                <a:latin typeface="Consolas" panose="020B0609020204030204" pitchFamily="49" charset="0"/>
-              </a:rPr>
-              <a:t>=</a:t>
-            </a:r>
-            <a:r>
-              <a:rPr lang="en-US" sz="1800" dirty="0">
-                <a:solidFill>
-                  <a:srgbClr val="CE9178"/>
-                </a:solidFill>
-                <a:latin typeface="Consolas" panose="020B0609020204030204" pitchFamily="49" charset="0"/>
-              </a:rPr>
-              <a:t>"sha256-WpOohJOqMqqyKL9FccASB9O0KwACQJpFTUBLTYOVvVU="</a:t>
-            </a:r>
-            <a:r>
-              <a:rPr lang="en-US" sz="1800" dirty="0">
-                <a:solidFill>
-                  <a:srgbClr val="D4D4D4"/>
-                </a:solidFill>
-                <a:latin typeface="Consolas" panose="020B0609020204030204" pitchFamily="49" charset="0"/>
-              </a:rPr>
-              <a:t>  </a:t>
+              <a:t> </a:t>
             </a:r>
             <a:r>
               <a:rPr lang="en-US" sz="1800" dirty="0" err="1">
@@ -11368,74 +11286,6 @@
               </a:solidFill>
               <a:latin typeface="Consolas" panose="020B0609020204030204" pitchFamily="49" charset="0"/>
             </a:endParaRPr>
-          </a:p>
-          <a:p>
-            <a:pPr marL="0" indent="0">
-              <a:buNone/>
-            </a:pPr>
-            <a:r>
-              <a:rPr lang="en-US" sz="1800" dirty="0">
-                <a:solidFill>
-                  <a:srgbClr val="D4D4D4"/>
-                </a:solidFill>
-                <a:latin typeface="Consolas" panose="020B0609020204030204" pitchFamily="49" charset="0"/>
-              </a:rPr>
-              <a:t>    {% </a:t>
-            </a:r>
-            <a:r>
-              <a:rPr lang="en-US" sz="1800" dirty="0">
-                <a:solidFill>
-                  <a:srgbClr val="C586C0"/>
-                </a:solidFill>
-                <a:latin typeface="Consolas" panose="020B0609020204030204" pitchFamily="49" charset="0"/>
-              </a:rPr>
-              <a:t>block</a:t>
-            </a:r>
-            <a:r>
-              <a:rPr lang="en-US" sz="1800" dirty="0">
-                <a:solidFill>
-                  <a:srgbClr val="D4D4D4"/>
-                </a:solidFill>
-                <a:latin typeface="Consolas" panose="020B0609020204030204" pitchFamily="49" charset="0"/>
-              </a:rPr>
-              <a:t> </a:t>
-            </a:r>
-            <a:r>
-              <a:rPr lang="en-US" sz="1800" dirty="0" err="1">
-                <a:solidFill>
-                  <a:srgbClr val="9CDCFE"/>
-                </a:solidFill>
-                <a:latin typeface="Consolas" panose="020B0609020204030204" pitchFamily="49" charset="0"/>
-              </a:rPr>
-              <a:t>head_block</a:t>
-            </a:r>
-            <a:r>
-              <a:rPr lang="en-US" sz="1800" dirty="0">
-                <a:solidFill>
-                  <a:srgbClr val="D4D4D4"/>
-                </a:solidFill>
-                <a:latin typeface="Consolas" panose="020B0609020204030204" pitchFamily="49" charset="0"/>
-              </a:rPr>
-              <a:t> %} {% </a:t>
-            </a:r>
-            <a:r>
-              <a:rPr lang="en-US" sz="1800" dirty="0" err="1">
-                <a:solidFill>
-                  <a:srgbClr val="C586C0"/>
-                </a:solidFill>
-                <a:latin typeface="Consolas" panose="020B0609020204030204" pitchFamily="49" charset="0"/>
-              </a:rPr>
-              <a:t>endblock</a:t>
-            </a:r>
-            <a:r>
-              <a:rPr lang="en-US" sz="1800" dirty="0">
-                <a:solidFill>
-                  <a:srgbClr val="D4D4D4"/>
-                </a:solidFill>
-                <a:latin typeface="Consolas" panose="020B0609020204030204" pitchFamily="49" charset="0"/>
-              </a:rPr>
-              <a:t> %}</a:t>
-            </a:r>
           </a:p>
           <a:p>
             <a:pPr marL="0" indent="0">
@@ -11810,7 +11660,435 @@
           <p:cNvPr id="2" name="Title 1">
             <a:extLst>
               <a:ext uri="{FF2B5EF4-FFF2-40B4-BE49-F238E27FC236}">
-                <a16:creationId xmlns:a16="http://schemas.microsoft.com/office/drawing/2014/main" id="{9D0BA249-DBF2-49E1-A8B1-7446CD0D7A03}"/>
+                <a16:creationId xmlns:a16="http://schemas.microsoft.com/office/drawing/2014/main" id="{32D862FE-4104-4A4F-A517-E76B0E9B8A93}"/>
+              </a:ext>
+            </a:extLst>
+          </p:cNvPr>
+          <p:cNvSpPr>
+            <a:spLocks noGrp="1"/>
+          </p:cNvSpPr>
+          <p:nvPr>
+            <p:ph type="title"/>
+          </p:nvPr>
+        </p:nvSpPr>
+        <p:spPr/>
+        <p:txBody>
+          <a:bodyPr/>
+          <a:lstStyle/>
+          <a:p>
+            <a:r>
+              <a:rPr lang="en-US" dirty="0"/>
+              <a:t>eventhandler.js</a:t>
+            </a:r>
+          </a:p>
+        </p:txBody>
+      </p:sp>
+      <p:sp>
+        <p:nvSpPr>
+          <p:cNvPr id="3" name="Content Placeholder 2">
+            <a:extLst>
+              <a:ext uri="{FF2B5EF4-FFF2-40B4-BE49-F238E27FC236}">
+                <a16:creationId xmlns:a16="http://schemas.microsoft.com/office/drawing/2014/main" id="{BB9D505D-43A1-45D1-8245-2D74651CB9BD}"/>
+              </a:ext>
+            </a:extLst>
+          </p:cNvPr>
+          <p:cNvSpPr>
+            <a:spLocks noGrp="1"/>
+          </p:cNvSpPr>
+          <p:nvPr>
+            <p:ph idx="1"/>
+          </p:nvPr>
+        </p:nvSpPr>
+        <p:spPr>
+          <a:xfrm>
+            <a:off x="838200" y="1690688"/>
+            <a:ext cx="10515600" cy="1754326"/>
+          </a:xfrm>
+        </p:spPr>
+        <p:txBody>
+          <a:bodyPr>
+            <a:normAutofit lnSpcReduction="10000"/>
+          </a:bodyPr>
+          <a:lstStyle/>
+          <a:p>
+            <a:r>
+              <a:rPr lang="en-US" dirty="0"/>
+              <a:t>Create a function that gets called when the rating field is double clicked.</a:t>
+            </a:r>
+            <a:r>
+              <a:rPr lang="en-US" sz="1500" dirty="0">
+                <a:solidFill>
+                  <a:srgbClr val="DCDCAA"/>
+                </a:solidFill>
+                <a:latin typeface="Consolas" panose="020B0609020204030204" pitchFamily="49" charset="0"/>
+              </a:rPr>
+              <a:t> </a:t>
+            </a:r>
+          </a:p>
+          <a:p>
+            <a:r>
+              <a:rPr lang="en-US" dirty="0"/>
+              <a:t>We need an identifier to find if any rating field is clicked, so lets add a class = “</a:t>
+            </a:r>
+            <a:r>
+              <a:rPr lang="en-US" dirty="0" err="1"/>
+              <a:t>rating_cell</a:t>
+            </a:r>
+            <a:r>
+              <a:rPr lang="en-US" dirty="0"/>
+              <a:t>” for all the rating cells.</a:t>
+            </a:r>
+          </a:p>
+          <a:p>
+            <a:endParaRPr lang="en-US" dirty="0"/>
+          </a:p>
+          <a:p>
+            <a:endParaRPr lang="en-US" dirty="0"/>
+          </a:p>
+          <a:p>
+            <a:pPr marL="0" lvl="0" indent="0">
+              <a:buNone/>
+            </a:pPr>
+            <a:endParaRPr lang="en-US" sz="1500" dirty="0">
+              <a:solidFill>
+                <a:srgbClr val="DCDCAA"/>
+              </a:solidFill>
+              <a:latin typeface="Consolas" panose="020B0609020204030204" pitchFamily="49" charset="0"/>
+            </a:endParaRPr>
+          </a:p>
+          <a:p>
+            <a:endParaRPr lang="en-US" dirty="0"/>
+          </a:p>
+        </p:txBody>
+      </p:sp>
+      <p:sp>
+        <p:nvSpPr>
+          <p:cNvPr id="4" name="Rectangle 3">
+            <a:extLst>
+              <a:ext uri="{FF2B5EF4-FFF2-40B4-BE49-F238E27FC236}">
+                <a16:creationId xmlns:a16="http://schemas.microsoft.com/office/drawing/2014/main" id="{6AAC156D-524F-4CD6-9B24-355CD92FF5C5}"/>
+              </a:ext>
+            </a:extLst>
+          </p:cNvPr>
+          <p:cNvSpPr/>
+          <p:nvPr/>
+        </p:nvSpPr>
+        <p:spPr>
+          <a:xfrm>
+            <a:off x="1028699" y="3792537"/>
+            <a:ext cx="10134602" cy="2308324"/>
+          </a:xfrm>
+          <a:prstGeom prst="rect">
+            <a:avLst/>
+          </a:prstGeom>
+          <a:solidFill>
+            <a:schemeClr val="tx1"/>
+          </a:solidFill>
+        </p:spPr>
+        <p:txBody>
+          <a:bodyPr wrap="square">
+            <a:spAutoFit/>
+          </a:bodyPr>
+          <a:lstStyle/>
+          <a:p>
+            <a:pPr lvl="0"/>
+            <a:r>
+              <a:rPr lang="en-US" sz="2400" dirty="0">
+                <a:solidFill>
+                  <a:srgbClr val="DCDCAA"/>
+                </a:solidFill>
+                <a:latin typeface="Consolas" panose="020B0609020204030204" pitchFamily="49" charset="0"/>
+              </a:rPr>
+              <a:t>$</a:t>
+            </a:r>
+            <a:r>
+              <a:rPr lang="en-US" sz="2400" dirty="0">
+                <a:solidFill>
+                  <a:srgbClr val="D4D4D4"/>
+                </a:solidFill>
+                <a:latin typeface="Consolas" panose="020B0609020204030204" pitchFamily="49" charset="0"/>
+              </a:rPr>
+              <a:t>(</a:t>
+            </a:r>
+            <a:r>
+              <a:rPr lang="en-US" sz="2400" dirty="0">
+                <a:solidFill>
+                  <a:srgbClr val="569CD6"/>
+                </a:solidFill>
+                <a:latin typeface="Consolas" panose="020B0609020204030204" pitchFamily="49" charset="0"/>
+              </a:rPr>
+              <a:t>function</a:t>
+            </a:r>
+            <a:r>
+              <a:rPr lang="en-US" sz="2400" dirty="0">
+                <a:solidFill>
+                  <a:srgbClr val="D4D4D4"/>
+                </a:solidFill>
+                <a:latin typeface="Consolas" panose="020B0609020204030204" pitchFamily="49" charset="0"/>
+              </a:rPr>
+              <a:t> () {</a:t>
+            </a:r>
+          </a:p>
+          <a:p>
+            <a:pPr lvl="0"/>
+            <a:r>
+              <a:rPr lang="en-US" sz="2400" dirty="0">
+                <a:solidFill>
+                  <a:srgbClr val="D4D4D4"/>
+                </a:solidFill>
+                <a:latin typeface="Consolas" panose="020B0609020204030204" pitchFamily="49" charset="0"/>
+              </a:rPr>
+              <a:t>    </a:t>
+            </a:r>
+            <a:r>
+              <a:rPr lang="en-US" sz="2400" dirty="0">
+                <a:solidFill>
+                  <a:srgbClr val="DCDCAA"/>
+                </a:solidFill>
+                <a:latin typeface="Consolas" panose="020B0609020204030204" pitchFamily="49" charset="0"/>
+              </a:rPr>
+              <a:t>$</a:t>
+            </a:r>
+            <a:r>
+              <a:rPr lang="en-US" sz="2400" dirty="0">
+                <a:solidFill>
+                  <a:srgbClr val="D4D4D4"/>
+                </a:solidFill>
+                <a:latin typeface="Consolas" panose="020B0609020204030204" pitchFamily="49" charset="0"/>
+              </a:rPr>
+              <a:t>(</a:t>
+            </a:r>
+            <a:r>
+              <a:rPr lang="en-US" sz="2400" dirty="0">
+                <a:solidFill>
+                  <a:srgbClr val="CE9178"/>
+                </a:solidFill>
+                <a:latin typeface="Consolas" panose="020B0609020204030204" pitchFamily="49" charset="0"/>
+              </a:rPr>
+              <a:t>".</a:t>
+            </a:r>
+            <a:r>
+              <a:rPr lang="en-US" sz="2400" dirty="0" err="1">
+                <a:solidFill>
+                  <a:srgbClr val="CE9178"/>
+                </a:solidFill>
+                <a:latin typeface="Consolas" panose="020B0609020204030204" pitchFamily="49" charset="0"/>
+              </a:rPr>
+              <a:t>rating_cell</a:t>
+            </a:r>
+            <a:r>
+              <a:rPr lang="en-US" sz="2400" dirty="0">
+                <a:solidFill>
+                  <a:srgbClr val="CE9178"/>
+                </a:solidFill>
+                <a:latin typeface="Consolas" panose="020B0609020204030204" pitchFamily="49" charset="0"/>
+              </a:rPr>
+              <a:t>"</a:t>
+            </a:r>
+            <a:r>
+              <a:rPr lang="en-US" sz="2400" dirty="0">
+                <a:solidFill>
+                  <a:srgbClr val="D4D4D4"/>
+                </a:solidFill>
+                <a:latin typeface="Consolas" panose="020B0609020204030204" pitchFamily="49" charset="0"/>
+              </a:rPr>
+              <a:t>).</a:t>
+            </a:r>
+            <a:r>
+              <a:rPr lang="en-US" sz="2400" dirty="0" err="1">
+                <a:solidFill>
+                  <a:srgbClr val="DCDCAA"/>
+                </a:solidFill>
+                <a:latin typeface="Consolas" panose="020B0609020204030204" pitchFamily="49" charset="0"/>
+              </a:rPr>
+              <a:t>dblclick</a:t>
+            </a:r>
+            <a:r>
+              <a:rPr lang="en-US" sz="2400" dirty="0">
+                <a:solidFill>
+                  <a:srgbClr val="D4D4D4"/>
+                </a:solidFill>
+                <a:latin typeface="Consolas" panose="020B0609020204030204" pitchFamily="49" charset="0"/>
+              </a:rPr>
+              <a:t>(</a:t>
+            </a:r>
+            <a:r>
+              <a:rPr lang="en-US" sz="2400" dirty="0">
+                <a:solidFill>
+                  <a:srgbClr val="569CD6"/>
+                </a:solidFill>
+                <a:latin typeface="Consolas" panose="020B0609020204030204" pitchFamily="49" charset="0"/>
+              </a:rPr>
+              <a:t>function</a:t>
+            </a:r>
+            <a:r>
+              <a:rPr lang="en-US" sz="2400" dirty="0">
+                <a:solidFill>
+                  <a:srgbClr val="D4D4D4"/>
+                </a:solidFill>
+                <a:latin typeface="Consolas" panose="020B0609020204030204" pitchFamily="49" charset="0"/>
+              </a:rPr>
+              <a:t> (</a:t>
+            </a:r>
+            <a:r>
+              <a:rPr lang="en-US" sz="2400" dirty="0">
+                <a:solidFill>
+                  <a:srgbClr val="9CDCFE"/>
+                </a:solidFill>
+                <a:latin typeface="Consolas" panose="020B0609020204030204" pitchFamily="49" charset="0"/>
+              </a:rPr>
+              <a:t>e</a:t>
+            </a:r>
+            <a:r>
+              <a:rPr lang="en-US" sz="2400" dirty="0">
+                <a:solidFill>
+                  <a:srgbClr val="D4D4D4"/>
+                </a:solidFill>
+                <a:latin typeface="Consolas" panose="020B0609020204030204" pitchFamily="49" charset="0"/>
+              </a:rPr>
+              <a:t>) {</a:t>
+            </a:r>
+          </a:p>
+          <a:p>
+            <a:pPr lvl="0"/>
+            <a:r>
+              <a:rPr lang="en-US" sz="2400" dirty="0">
+                <a:solidFill>
+                  <a:srgbClr val="D4D4D4"/>
+                </a:solidFill>
+                <a:latin typeface="Consolas" panose="020B0609020204030204" pitchFamily="49" charset="0"/>
+              </a:rPr>
+              <a:t>        </a:t>
+            </a:r>
+            <a:r>
+              <a:rPr lang="en-US" sz="2400" dirty="0" err="1">
+                <a:solidFill>
+                  <a:srgbClr val="9CDCFE"/>
+                </a:solidFill>
+                <a:latin typeface="Consolas" panose="020B0609020204030204" pitchFamily="49" charset="0"/>
+              </a:rPr>
+              <a:t>e</a:t>
+            </a:r>
+            <a:r>
+              <a:rPr lang="en-US" sz="2400" dirty="0" err="1">
+                <a:solidFill>
+                  <a:srgbClr val="D4D4D4"/>
+                </a:solidFill>
+                <a:latin typeface="Consolas" panose="020B0609020204030204" pitchFamily="49" charset="0"/>
+              </a:rPr>
+              <a:t>.</a:t>
+            </a:r>
+            <a:r>
+              <a:rPr lang="en-US" sz="2400" dirty="0" err="1">
+                <a:solidFill>
+                  <a:srgbClr val="DCDCAA"/>
+                </a:solidFill>
+                <a:latin typeface="Consolas" panose="020B0609020204030204" pitchFamily="49" charset="0"/>
+              </a:rPr>
+              <a:t>stopPropagation</a:t>
+            </a:r>
+            <a:r>
+              <a:rPr lang="en-US" sz="2400" dirty="0">
+                <a:solidFill>
+                  <a:srgbClr val="D4D4D4"/>
+                </a:solidFill>
+                <a:latin typeface="Consolas" panose="020B0609020204030204" pitchFamily="49" charset="0"/>
+              </a:rPr>
+              <a:t>();</a:t>
+            </a:r>
+          </a:p>
+          <a:p>
+            <a:pPr lvl="0"/>
+            <a:r>
+              <a:rPr lang="en-US" sz="2400" dirty="0">
+                <a:solidFill>
+                  <a:srgbClr val="D4D4D4"/>
+                </a:solidFill>
+                <a:latin typeface="Consolas" panose="020B0609020204030204" pitchFamily="49" charset="0"/>
+              </a:rPr>
+              <a:t>        </a:t>
+            </a:r>
+            <a:r>
+              <a:rPr lang="en-US" sz="2400" dirty="0">
+                <a:solidFill>
+                  <a:srgbClr val="569CD6"/>
+                </a:solidFill>
+                <a:latin typeface="Consolas" panose="020B0609020204030204" pitchFamily="49" charset="0"/>
+              </a:rPr>
+              <a:t>alert(“I am double clicked”)</a:t>
+            </a:r>
+            <a:r>
+              <a:rPr lang="en-US" sz="2400" dirty="0">
+                <a:solidFill>
+                  <a:srgbClr val="D4D4D4"/>
+                </a:solidFill>
+                <a:latin typeface="Consolas" panose="020B0609020204030204" pitchFamily="49" charset="0"/>
+              </a:rPr>
+              <a:t>;</a:t>
+            </a:r>
+          </a:p>
+          <a:p>
+            <a:pPr lvl="0"/>
+            <a:r>
+              <a:rPr lang="en-US" sz="2400" dirty="0">
+                <a:solidFill>
+                  <a:srgbClr val="D4D4D4"/>
+                </a:solidFill>
+                <a:latin typeface="Consolas" panose="020B0609020204030204" pitchFamily="49" charset="0"/>
+              </a:rPr>
+              <a:t>    });</a:t>
+            </a:r>
+          </a:p>
+          <a:p>
+            <a:pPr lvl="0"/>
+            <a:r>
+              <a:rPr lang="en-US" sz="2400" dirty="0">
+                <a:solidFill>
+                  <a:srgbClr val="D4D4D4"/>
+                </a:solidFill>
+                <a:latin typeface="Consolas" panose="020B0609020204030204" pitchFamily="49" charset="0"/>
+              </a:rPr>
+              <a:t>});</a:t>
+            </a:r>
+          </a:p>
+        </p:txBody>
+      </p:sp>
+    </p:spTree>
+    <p:extLst>
+      <p:ext uri="{BB962C8B-B14F-4D97-AF65-F5344CB8AC3E}">
+        <p14:creationId xmlns:p14="http://schemas.microsoft.com/office/powerpoint/2010/main" val="2181332568"/>
+      </p:ext>
+    </p:extLst>
+  </p:cSld>
+  <p:clrMapOvr>
+    <a:masterClrMapping/>
+  </p:clrMapOvr>
+</p:sld>
+</file>
+
+<file path=ppt/slides/slide28.xml><?xml version="1.0" encoding="utf-8"?>
+<p:sld xmlns:a="http://schemas.openxmlformats.org/drawingml/2006/main" xmlns:r="http://schemas.openxmlformats.org/officeDocument/2006/relationships" xmlns:p="http://schemas.openxmlformats.org/presentationml/2006/main">
+  <p:cSld>
+    <p:spTree>
+      <p:nvGrpSpPr>
+        <p:cNvPr id="1" name=""/>
+        <p:cNvGrpSpPr/>
+        <p:nvPr/>
+      </p:nvGrpSpPr>
+      <p:grpSpPr>
+        <a:xfrm>
+          <a:off x="0" y="0"/>
+          <a:ext cx="0" cy="0"/>
+          <a:chOff x="0" y="0"/>
+          <a:chExt cx="0" cy="0"/>
+        </a:xfrm>
+      </p:grpSpPr>
+      <p:sp>
+        <p:nvSpPr>
+          <p:cNvPr id="5" name="Title 1">
+            <a:extLst>
+              <a:ext uri="{FF2B5EF4-FFF2-40B4-BE49-F238E27FC236}">
+                <a16:creationId xmlns:a16="http://schemas.microsoft.com/office/drawing/2014/main" id="{854C85E7-9AFD-40D6-AEC3-A039325C6484}"/>
               </a:ext>
             </a:extLst>
           </p:cNvPr>
@@ -11823,14 +12101,71 @@
         </p:nvSpPr>
         <p:spPr>
           <a:xfrm>
-            <a:off x="0" y="77333"/>
-            <a:ext cx="10515600" cy="603704"/>
+            <a:off x="141514" y="2682328"/>
+            <a:ext cx="11832771" cy="1325563"/>
           </a:xfrm>
         </p:spPr>
         <p:txBody>
-          <a:bodyPr>
-            <a:normAutofit fontScale="90000"/>
-          </a:bodyPr>
+          <a:bodyPr/>
+          <a:lstStyle/>
+          <a:p>
+            <a:pPr algn="ctr"/>
+            <a:r>
+              <a:rPr lang="en-US" dirty="0"/>
+              <a:t>Checkpoint : Did the alert appear on double click?</a:t>
+            </a:r>
+          </a:p>
+        </p:txBody>
+      </p:sp>
+    </p:spTree>
+    <p:extLst>
+      <p:ext uri="{BB962C8B-B14F-4D97-AF65-F5344CB8AC3E}">
+        <p14:creationId xmlns:p14="http://schemas.microsoft.com/office/powerpoint/2010/main" val="1137648596"/>
+      </p:ext>
+    </p:extLst>
+  </p:cSld>
+  <p:clrMapOvr>
+    <a:masterClrMapping/>
+  </p:clrMapOvr>
+</p:sld>
+</file>
+
+<file path=ppt/slides/slide29.xml><?xml version="1.0" encoding="utf-8"?>
+<p:sld xmlns:a="http://schemas.openxmlformats.org/drawingml/2006/main" xmlns:r="http://schemas.openxmlformats.org/officeDocument/2006/relationships" xmlns:p="http://schemas.openxmlformats.org/presentationml/2006/main">
+  <p:cSld>
+    <p:spTree>
+      <p:nvGrpSpPr>
+        <p:cNvPr id="1" name=""/>
+        <p:cNvGrpSpPr/>
+        <p:nvPr/>
+      </p:nvGrpSpPr>
+      <p:grpSpPr>
+        <a:xfrm>
+          <a:off x="0" y="0"/>
+          <a:ext cx="0" cy="0"/>
+          <a:chOff x="0" y="0"/>
+          <a:chExt cx="0" cy="0"/>
+        </a:xfrm>
+      </p:grpSpPr>
+      <p:sp>
+        <p:nvSpPr>
+          <p:cNvPr id="2" name="Title 1">
+            <a:extLst>
+              <a:ext uri="{FF2B5EF4-FFF2-40B4-BE49-F238E27FC236}">
+                <a16:creationId xmlns:a16="http://schemas.microsoft.com/office/drawing/2014/main" id="{0BDA4907-E0F4-4674-A38F-D2D28186FC4E}"/>
+              </a:ext>
+            </a:extLst>
+          </p:cNvPr>
+          <p:cNvSpPr>
+            <a:spLocks noGrp="1"/>
+          </p:cNvSpPr>
+          <p:nvPr>
+            <p:ph type="title"/>
+          </p:nvPr>
+        </p:nvSpPr>
+        <p:spPr/>
+        <p:txBody>
+          <a:bodyPr/>
           <a:lstStyle/>
           <a:p>
             <a:r>
@@ -11845,7 +12180,7 @@
           <p:cNvPr id="3" name="Content Placeholder 2">
             <a:extLst>
               <a:ext uri="{FF2B5EF4-FFF2-40B4-BE49-F238E27FC236}">
-                <a16:creationId xmlns:a16="http://schemas.microsoft.com/office/drawing/2014/main" id="{36362407-461E-4E3A-BB61-827E255F49D8}"/>
+                <a16:creationId xmlns:a16="http://schemas.microsoft.com/office/drawing/2014/main" id="{FC085861-025F-419C-B008-62BEFB3F5DC7}"/>
               </a:ext>
             </a:extLst>
           </p:cNvPr>
@@ -11856,1513 +12191,40 @@
             <p:ph idx="1"/>
           </p:nvPr>
         </p:nvSpPr>
-        <p:spPr>
-          <a:xfrm>
-            <a:off x="119743" y="681037"/>
-            <a:ext cx="11876314" cy="6099630"/>
-          </a:xfrm>
-          <a:solidFill>
-            <a:schemeClr val="tx1"/>
-          </a:solidFill>
-        </p:spPr>
+        <p:spPr/>
         <p:txBody>
-          <a:bodyPr>
-            <a:normAutofit fontScale="55000" lnSpcReduction="20000"/>
-          </a:bodyPr>
+          <a:bodyPr/>
           <a:lstStyle/>
           <a:p>
-            <a:pPr marL="0" indent="0">
-              <a:buNone/>
-            </a:pPr>
-            <a:r>
-              <a:rPr lang="en-US" dirty="0">
-                <a:solidFill>
-                  <a:srgbClr val="DCDCAA"/>
-                </a:solidFill>
-                <a:latin typeface="Consolas" panose="020B0609020204030204" pitchFamily="49" charset="0"/>
-              </a:rPr>
-              <a:t>$</a:t>
-            </a:r>
-            <a:r>
-              <a:rPr lang="en-US" dirty="0">
-                <a:solidFill>
-                  <a:srgbClr val="D4D4D4"/>
-                </a:solidFill>
-                <a:latin typeface="Consolas" panose="020B0609020204030204" pitchFamily="49" charset="0"/>
-              </a:rPr>
-              <a:t>(</a:t>
-            </a:r>
-            <a:r>
-              <a:rPr lang="en-US" dirty="0">
-                <a:solidFill>
-                  <a:srgbClr val="569CD6"/>
-                </a:solidFill>
-                <a:latin typeface="Consolas" panose="020B0609020204030204" pitchFamily="49" charset="0"/>
-              </a:rPr>
-              <a:t>function</a:t>
-            </a:r>
-            <a:r>
-              <a:rPr lang="en-US" dirty="0">
-                <a:solidFill>
-                  <a:srgbClr val="D4D4D4"/>
-                </a:solidFill>
-                <a:latin typeface="Consolas" panose="020B0609020204030204" pitchFamily="49" charset="0"/>
-              </a:rPr>
-              <a:t> () {</a:t>
-            </a:r>
-          </a:p>
-          <a:p>
-            <a:pPr marL="0" indent="0">
-              <a:buNone/>
-            </a:pPr>
-            <a:r>
-              <a:rPr lang="en-US" dirty="0">
-                <a:solidFill>
-                  <a:srgbClr val="D4D4D4"/>
-                </a:solidFill>
-                <a:latin typeface="Consolas" panose="020B0609020204030204" pitchFamily="49" charset="0"/>
-              </a:rPr>
-              <a:t>    </a:t>
-            </a:r>
-            <a:r>
-              <a:rPr lang="en-US" dirty="0">
-                <a:solidFill>
-                  <a:srgbClr val="DCDCAA"/>
-                </a:solidFill>
-                <a:latin typeface="Consolas" panose="020B0609020204030204" pitchFamily="49" charset="0"/>
-              </a:rPr>
-              <a:t>$</a:t>
-            </a:r>
-            <a:r>
-              <a:rPr lang="en-US" dirty="0">
-                <a:solidFill>
-                  <a:srgbClr val="D4D4D4"/>
-                </a:solidFill>
-                <a:latin typeface="Consolas" panose="020B0609020204030204" pitchFamily="49" charset="0"/>
-              </a:rPr>
-              <a:t>(</a:t>
-            </a:r>
-            <a:r>
-              <a:rPr lang="en-US" dirty="0">
-                <a:solidFill>
-                  <a:srgbClr val="CE9178"/>
-                </a:solidFill>
-                <a:latin typeface="Consolas" panose="020B0609020204030204" pitchFamily="49" charset="0"/>
-              </a:rPr>
-              <a:t>".</a:t>
-            </a:r>
-            <a:r>
-              <a:rPr lang="en-US" dirty="0" err="1">
-                <a:solidFill>
-                  <a:srgbClr val="CE9178"/>
-                </a:solidFill>
-                <a:latin typeface="Consolas" panose="020B0609020204030204" pitchFamily="49" charset="0"/>
-              </a:rPr>
-              <a:t>rating_cell</a:t>
-            </a:r>
-            <a:r>
-              <a:rPr lang="en-US" dirty="0">
-                <a:solidFill>
-                  <a:srgbClr val="CE9178"/>
-                </a:solidFill>
-                <a:latin typeface="Consolas" panose="020B0609020204030204" pitchFamily="49" charset="0"/>
-              </a:rPr>
-              <a:t>"</a:t>
-            </a:r>
-            <a:r>
-              <a:rPr lang="en-US" dirty="0">
-                <a:solidFill>
-                  <a:srgbClr val="D4D4D4"/>
-                </a:solidFill>
-                <a:latin typeface="Consolas" panose="020B0609020204030204" pitchFamily="49" charset="0"/>
-              </a:rPr>
-              <a:t>).</a:t>
-            </a:r>
-            <a:r>
-              <a:rPr lang="en-US" dirty="0" err="1">
-                <a:solidFill>
-                  <a:srgbClr val="DCDCAA"/>
-                </a:solidFill>
-                <a:latin typeface="Consolas" panose="020B0609020204030204" pitchFamily="49" charset="0"/>
-              </a:rPr>
-              <a:t>dblclick</a:t>
-            </a:r>
-            <a:r>
-              <a:rPr lang="en-US" dirty="0">
-                <a:solidFill>
-                  <a:srgbClr val="D4D4D4"/>
-                </a:solidFill>
-                <a:latin typeface="Consolas" panose="020B0609020204030204" pitchFamily="49" charset="0"/>
-              </a:rPr>
-              <a:t>(</a:t>
-            </a:r>
-            <a:r>
-              <a:rPr lang="en-US" dirty="0">
-                <a:solidFill>
-                  <a:srgbClr val="569CD6"/>
-                </a:solidFill>
-                <a:latin typeface="Consolas" panose="020B0609020204030204" pitchFamily="49" charset="0"/>
-              </a:rPr>
-              <a:t>function</a:t>
-            </a:r>
-            <a:r>
-              <a:rPr lang="en-US" dirty="0">
-                <a:solidFill>
-                  <a:srgbClr val="D4D4D4"/>
-                </a:solidFill>
-                <a:latin typeface="Consolas" panose="020B0609020204030204" pitchFamily="49" charset="0"/>
-              </a:rPr>
-              <a:t> (</a:t>
-            </a:r>
-            <a:r>
-              <a:rPr lang="en-US" dirty="0">
-                <a:solidFill>
-                  <a:srgbClr val="9CDCFE"/>
-                </a:solidFill>
-                <a:latin typeface="Consolas" panose="020B0609020204030204" pitchFamily="49" charset="0"/>
-              </a:rPr>
-              <a:t>e</a:t>
-            </a:r>
-            <a:r>
-              <a:rPr lang="en-US" dirty="0">
-                <a:solidFill>
-                  <a:srgbClr val="D4D4D4"/>
-                </a:solidFill>
-                <a:latin typeface="Consolas" panose="020B0609020204030204" pitchFamily="49" charset="0"/>
-              </a:rPr>
-              <a:t>) {</a:t>
-            </a:r>
-          </a:p>
-          <a:p>
-            <a:pPr marL="0" indent="0">
-              <a:buNone/>
-            </a:pPr>
-            <a:r>
-              <a:rPr lang="en-US" dirty="0">
-                <a:solidFill>
-                  <a:srgbClr val="D4D4D4"/>
-                </a:solidFill>
-                <a:latin typeface="Consolas" panose="020B0609020204030204" pitchFamily="49" charset="0"/>
-              </a:rPr>
-              <a:t>        </a:t>
-            </a:r>
-            <a:r>
-              <a:rPr lang="en-US" dirty="0" err="1">
-                <a:solidFill>
-                  <a:srgbClr val="9CDCFE"/>
-                </a:solidFill>
-                <a:latin typeface="Consolas" panose="020B0609020204030204" pitchFamily="49" charset="0"/>
-              </a:rPr>
-              <a:t>e</a:t>
-            </a:r>
-            <a:r>
-              <a:rPr lang="en-US" dirty="0" err="1">
-                <a:solidFill>
-                  <a:srgbClr val="D4D4D4"/>
-                </a:solidFill>
-                <a:latin typeface="Consolas" panose="020B0609020204030204" pitchFamily="49" charset="0"/>
-              </a:rPr>
-              <a:t>.</a:t>
-            </a:r>
-            <a:r>
-              <a:rPr lang="en-US" dirty="0" err="1">
-                <a:solidFill>
-                  <a:srgbClr val="DCDCAA"/>
-                </a:solidFill>
-                <a:latin typeface="Consolas" panose="020B0609020204030204" pitchFamily="49" charset="0"/>
-              </a:rPr>
-              <a:t>stopPropagation</a:t>
-            </a:r>
-            <a:r>
-              <a:rPr lang="en-US" dirty="0">
-                <a:solidFill>
-                  <a:srgbClr val="D4D4D4"/>
-                </a:solidFill>
-                <a:latin typeface="Consolas" panose="020B0609020204030204" pitchFamily="49" charset="0"/>
-              </a:rPr>
-              <a:t>();</a:t>
-            </a:r>
-          </a:p>
-          <a:p>
-            <a:pPr marL="0" indent="0">
-              <a:buNone/>
-            </a:pPr>
-            <a:r>
-              <a:rPr lang="en-US" dirty="0">
-                <a:solidFill>
-                  <a:srgbClr val="D4D4D4"/>
-                </a:solidFill>
-                <a:latin typeface="Consolas" panose="020B0609020204030204" pitchFamily="49" charset="0"/>
-              </a:rPr>
-              <a:t>        </a:t>
-            </a:r>
-            <a:r>
-              <a:rPr lang="en-US" dirty="0">
-                <a:solidFill>
-                  <a:srgbClr val="569CD6"/>
-                </a:solidFill>
-                <a:latin typeface="Consolas" panose="020B0609020204030204" pitchFamily="49" charset="0"/>
-              </a:rPr>
-              <a:t>var</a:t>
-            </a:r>
-            <a:r>
-              <a:rPr lang="en-US" dirty="0">
-                <a:solidFill>
-                  <a:srgbClr val="D4D4D4"/>
-                </a:solidFill>
-                <a:latin typeface="Consolas" panose="020B0609020204030204" pitchFamily="49" charset="0"/>
-              </a:rPr>
-              <a:t> </a:t>
-            </a:r>
-            <a:r>
-              <a:rPr lang="en-US" dirty="0" err="1">
-                <a:solidFill>
-                  <a:srgbClr val="9CDCFE"/>
-                </a:solidFill>
-                <a:latin typeface="Consolas" panose="020B0609020204030204" pitchFamily="49" charset="0"/>
-              </a:rPr>
-              <a:t>currentEle</a:t>
-            </a:r>
-            <a:r>
-              <a:rPr lang="en-US" dirty="0">
-                <a:solidFill>
-                  <a:srgbClr val="D4D4D4"/>
-                </a:solidFill>
-                <a:latin typeface="Consolas" panose="020B0609020204030204" pitchFamily="49" charset="0"/>
-              </a:rPr>
-              <a:t> = </a:t>
-            </a:r>
-            <a:r>
-              <a:rPr lang="en-US" dirty="0">
-                <a:solidFill>
-                  <a:srgbClr val="DCDCAA"/>
-                </a:solidFill>
-                <a:latin typeface="Consolas" panose="020B0609020204030204" pitchFamily="49" charset="0"/>
-              </a:rPr>
-              <a:t>$</a:t>
-            </a:r>
-            <a:r>
-              <a:rPr lang="en-US" dirty="0">
-                <a:solidFill>
-                  <a:srgbClr val="D4D4D4"/>
-                </a:solidFill>
-                <a:latin typeface="Consolas" panose="020B0609020204030204" pitchFamily="49" charset="0"/>
-              </a:rPr>
-              <a:t>(</a:t>
-            </a:r>
-            <a:r>
-              <a:rPr lang="en-US" dirty="0">
-                <a:solidFill>
-                  <a:srgbClr val="569CD6"/>
-                </a:solidFill>
-                <a:latin typeface="Consolas" panose="020B0609020204030204" pitchFamily="49" charset="0"/>
-              </a:rPr>
-              <a:t>this</a:t>
-            </a:r>
-            <a:r>
-              <a:rPr lang="en-US" dirty="0">
-                <a:solidFill>
-                  <a:srgbClr val="D4D4D4"/>
-                </a:solidFill>
-                <a:latin typeface="Consolas" panose="020B0609020204030204" pitchFamily="49" charset="0"/>
-              </a:rPr>
-              <a:t>);</a:t>
-            </a:r>
-          </a:p>
-          <a:p>
-            <a:pPr marL="0" indent="0">
-              <a:buNone/>
-            </a:pPr>
-            <a:r>
-              <a:rPr lang="en-US" dirty="0">
-                <a:solidFill>
-                  <a:srgbClr val="D4D4D4"/>
-                </a:solidFill>
-                <a:latin typeface="Consolas" panose="020B0609020204030204" pitchFamily="49" charset="0"/>
-              </a:rPr>
-              <a:t>        </a:t>
-            </a:r>
-            <a:r>
-              <a:rPr lang="en-US" dirty="0">
-                <a:solidFill>
-                  <a:srgbClr val="569CD6"/>
-                </a:solidFill>
-                <a:latin typeface="Consolas" panose="020B0609020204030204" pitchFamily="49" charset="0"/>
-              </a:rPr>
-              <a:t>var</a:t>
-            </a:r>
-            <a:r>
-              <a:rPr lang="en-US" dirty="0">
-                <a:solidFill>
-                  <a:srgbClr val="D4D4D4"/>
-                </a:solidFill>
-                <a:latin typeface="Consolas" panose="020B0609020204030204" pitchFamily="49" charset="0"/>
-              </a:rPr>
-              <a:t> </a:t>
-            </a:r>
-            <a:r>
-              <a:rPr lang="en-US" dirty="0">
-                <a:solidFill>
-                  <a:srgbClr val="9CDCFE"/>
-                </a:solidFill>
-                <a:latin typeface="Consolas" panose="020B0609020204030204" pitchFamily="49" charset="0"/>
-              </a:rPr>
-              <a:t>value</a:t>
-            </a:r>
-            <a:r>
-              <a:rPr lang="en-US" dirty="0">
-                <a:solidFill>
-                  <a:srgbClr val="D4D4D4"/>
-                </a:solidFill>
-                <a:latin typeface="Consolas" panose="020B0609020204030204" pitchFamily="49" charset="0"/>
-              </a:rPr>
-              <a:t> = </a:t>
-            </a:r>
-            <a:r>
-              <a:rPr lang="en-US" dirty="0">
-                <a:solidFill>
-                  <a:srgbClr val="DCDCAA"/>
-                </a:solidFill>
-                <a:latin typeface="Consolas" panose="020B0609020204030204" pitchFamily="49" charset="0"/>
-              </a:rPr>
-              <a:t>$</a:t>
-            </a:r>
-            <a:r>
-              <a:rPr lang="en-US" dirty="0">
-                <a:solidFill>
-                  <a:srgbClr val="D4D4D4"/>
-                </a:solidFill>
-                <a:latin typeface="Consolas" panose="020B0609020204030204" pitchFamily="49" charset="0"/>
-              </a:rPr>
-              <a:t>(</a:t>
-            </a:r>
-            <a:r>
-              <a:rPr lang="en-US" dirty="0">
-                <a:solidFill>
-                  <a:srgbClr val="569CD6"/>
-                </a:solidFill>
-                <a:latin typeface="Consolas" panose="020B0609020204030204" pitchFamily="49" charset="0"/>
-              </a:rPr>
-              <a:t>this</a:t>
-            </a:r>
-            <a:r>
-              <a:rPr lang="en-US" dirty="0">
-                <a:solidFill>
-                  <a:srgbClr val="D4D4D4"/>
-                </a:solidFill>
-                <a:latin typeface="Consolas" panose="020B0609020204030204" pitchFamily="49" charset="0"/>
-              </a:rPr>
-              <a:t>).</a:t>
-            </a:r>
-            <a:r>
-              <a:rPr lang="en-US" dirty="0">
-                <a:solidFill>
-                  <a:srgbClr val="DCDCAA"/>
-                </a:solidFill>
-                <a:latin typeface="Consolas" panose="020B0609020204030204" pitchFamily="49" charset="0"/>
-              </a:rPr>
-              <a:t>html</a:t>
-            </a:r>
-            <a:r>
-              <a:rPr lang="en-US" dirty="0">
-                <a:solidFill>
-                  <a:srgbClr val="D4D4D4"/>
-                </a:solidFill>
-                <a:latin typeface="Consolas" panose="020B0609020204030204" pitchFamily="49" charset="0"/>
-              </a:rPr>
-              <a:t>();</a:t>
-            </a:r>
-          </a:p>
-          <a:p>
-            <a:pPr marL="0" indent="0">
-              <a:buNone/>
-            </a:pPr>
-            <a:r>
-              <a:rPr lang="en-US" dirty="0">
-                <a:solidFill>
-                  <a:srgbClr val="D4D4D4"/>
-                </a:solidFill>
-                <a:latin typeface="Consolas" panose="020B0609020204030204" pitchFamily="49" charset="0"/>
-              </a:rPr>
-              <a:t>        </a:t>
-            </a:r>
-            <a:r>
-              <a:rPr lang="en-US" dirty="0" err="1">
-                <a:solidFill>
-                  <a:srgbClr val="DCDCAA"/>
-                </a:solidFill>
-                <a:latin typeface="Consolas" panose="020B0609020204030204" pitchFamily="49" charset="0"/>
-              </a:rPr>
-              <a:t>updateVal</a:t>
-            </a:r>
-            <a:r>
-              <a:rPr lang="en-US" dirty="0">
-                <a:solidFill>
-                  <a:srgbClr val="D4D4D4"/>
-                </a:solidFill>
-                <a:latin typeface="Consolas" panose="020B0609020204030204" pitchFamily="49" charset="0"/>
-              </a:rPr>
-              <a:t>(</a:t>
-            </a:r>
-            <a:r>
-              <a:rPr lang="en-US" dirty="0" err="1">
-                <a:solidFill>
-                  <a:srgbClr val="9CDCFE"/>
-                </a:solidFill>
-                <a:latin typeface="Consolas" panose="020B0609020204030204" pitchFamily="49" charset="0"/>
-              </a:rPr>
-              <a:t>currentEle</a:t>
-            </a:r>
-            <a:r>
-              <a:rPr lang="en-US" dirty="0">
-                <a:solidFill>
-                  <a:srgbClr val="D4D4D4"/>
-                </a:solidFill>
-                <a:latin typeface="Consolas" panose="020B0609020204030204" pitchFamily="49" charset="0"/>
-              </a:rPr>
-              <a:t>, </a:t>
-            </a:r>
-            <a:r>
-              <a:rPr lang="en-US" dirty="0">
-                <a:solidFill>
-                  <a:srgbClr val="9CDCFE"/>
-                </a:solidFill>
-                <a:latin typeface="Consolas" panose="020B0609020204030204" pitchFamily="49" charset="0"/>
-              </a:rPr>
-              <a:t>value</a:t>
-            </a:r>
-            <a:r>
-              <a:rPr lang="en-US" dirty="0">
-                <a:solidFill>
-                  <a:srgbClr val="D4D4D4"/>
-                </a:solidFill>
-                <a:latin typeface="Consolas" panose="020B0609020204030204" pitchFamily="49" charset="0"/>
-              </a:rPr>
-              <a:t>);</a:t>
-            </a:r>
-          </a:p>
-          <a:p>
-            <a:pPr marL="0" indent="0">
-              <a:buNone/>
-            </a:pPr>
-            <a:r>
-              <a:rPr lang="en-US" dirty="0">
-                <a:solidFill>
-                  <a:srgbClr val="D4D4D4"/>
-                </a:solidFill>
-                <a:latin typeface="Consolas" panose="020B0609020204030204" pitchFamily="49" charset="0"/>
-              </a:rPr>
-              <a:t>    });</a:t>
-            </a:r>
-          </a:p>
-          <a:p>
-            <a:pPr marL="0" indent="0">
-              <a:buNone/>
-            </a:pPr>
-            <a:r>
-              <a:rPr lang="en-US" dirty="0">
-                <a:solidFill>
-                  <a:srgbClr val="D4D4D4"/>
-                </a:solidFill>
-                <a:latin typeface="Consolas" panose="020B0609020204030204" pitchFamily="49" charset="0"/>
-              </a:rPr>
-              <a:t>});</a:t>
-            </a:r>
-          </a:p>
-          <a:p>
-            <a:pPr marL="0" indent="0">
-              <a:buNone/>
-            </a:pPr>
-            <a:br>
-              <a:rPr lang="en-US" dirty="0">
-                <a:solidFill>
-                  <a:srgbClr val="D4D4D4"/>
-                </a:solidFill>
-                <a:latin typeface="Consolas" panose="020B0609020204030204" pitchFamily="49" charset="0"/>
-              </a:rPr>
-            </a:br>
-            <a:r>
-              <a:rPr lang="en-US" dirty="0">
-                <a:solidFill>
-                  <a:srgbClr val="569CD6"/>
-                </a:solidFill>
-                <a:latin typeface="Consolas" panose="020B0609020204030204" pitchFamily="49" charset="0"/>
-              </a:rPr>
-              <a:t>function</a:t>
-            </a:r>
-            <a:r>
-              <a:rPr lang="en-US" dirty="0">
-                <a:solidFill>
-                  <a:srgbClr val="D4D4D4"/>
-                </a:solidFill>
-                <a:latin typeface="Consolas" panose="020B0609020204030204" pitchFamily="49" charset="0"/>
-              </a:rPr>
-              <a:t> </a:t>
-            </a:r>
-            <a:r>
-              <a:rPr lang="en-US" dirty="0" err="1">
-                <a:solidFill>
-                  <a:srgbClr val="DCDCAA"/>
-                </a:solidFill>
-                <a:latin typeface="Consolas" panose="020B0609020204030204" pitchFamily="49" charset="0"/>
-              </a:rPr>
-              <a:t>updateVal</a:t>
-            </a:r>
-            <a:r>
-              <a:rPr lang="en-US" dirty="0">
-                <a:solidFill>
-                  <a:srgbClr val="D4D4D4"/>
-                </a:solidFill>
-                <a:latin typeface="Consolas" panose="020B0609020204030204" pitchFamily="49" charset="0"/>
-              </a:rPr>
-              <a:t>(</a:t>
-            </a:r>
-            <a:r>
-              <a:rPr lang="en-US" dirty="0" err="1">
-                <a:solidFill>
-                  <a:srgbClr val="9CDCFE"/>
-                </a:solidFill>
-                <a:latin typeface="Consolas" panose="020B0609020204030204" pitchFamily="49" charset="0"/>
-              </a:rPr>
-              <a:t>currentEle</a:t>
-            </a:r>
-            <a:r>
-              <a:rPr lang="en-US" dirty="0">
-                <a:solidFill>
-                  <a:srgbClr val="D4D4D4"/>
-                </a:solidFill>
-                <a:latin typeface="Consolas" panose="020B0609020204030204" pitchFamily="49" charset="0"/>
-              </a:rPr>
-              <a:t>, </a:t>
-            </a:r>
-            <a:r>
-              <a:rPr lang="en-US" dirty="0">
-                <a:solidFill>
-                  <a:srgbClr val="9CDCFE"/>
-                </a:solidFill>
-                <a:latin typeface="Consolas" panose="020B0609020204030204" pitchFamily="49" charset="0"/>
-              </a:rPr>
-              <a:t>value</a:t>
-            </a:r>
-            <a:r>
-              <a:rPr lang="en-US" dirty="0">
-                <a:solidFill>
-                  <a:srgbClr val="D4D4D4"/>
-                </a:solidFill>
-                <a:latin typeface="Consolas" panose="020B0609020204030204" pitchFamily="49" charset="0"/>
-              </a:rPr>
-              <a:t>) {</a:t>
-            </a:r>
-          </a:p>
-          <a:p>
-            <a:pPr marL="0" indent="0">
-              <a:buNone/>
-            </a:pPr>
-            <a:r>
-              <a:rPr lang="en-US" dirty="0">
-                <a:solidFill>
-                  <a:srgbClr val="D4D4D4"/>
-                </a:solidFill>
-                <a:latin typeface="Consolas" panose="020B0609020204030204" pitchFamily="49" charset="0"/>
-              </a:rPr>
-              <a:t>    </a:t>
-            </a:r>
-            <a:r>
-              <a:rPr lang="en-US" dirty="0">
-                <a:solidFill>
-                  <a:srgbClr val="DCDCAA"/>
-                </a:solidFill>
-                <a:latin typeface="Consolas" panose="020B0609020204030204" pitchFamily="49" charset="0"/>
-              </a:rPr>
-              <a:t>$</a:t>
-            </a:r>
-            <a:r>
-              <a:rPr lang="en-US" dirty="0">
-                <a:solidFill>
-                  <a:srgbClr val="D4D4D4"/>
-                </a:solidFill>
-                <a:latin typeface="Consolas" panose="020B0609020204030204" pitchFamily="49" charset="0"/>
-              </a:rPr>
-              <a:t>(</a:t>
-            </a:r>
-            <a:r>
-              <a:rPr lang="en-US" dirty="0" err="1">
-                <a:solidFill>
-                  <a:srgbClr val="9CDCFE"/>
-                </a:solidFill>
-                <a:latin typeface="Consolas" panose="020B0609020204030204" pitchFamily="49" charset="0"/>
-              </a:rPr>
-              <a:t>currentEle</a:t>
-            </a:r>
-            <a:r>
-              <a:rPr lang="en-US" dirty="0">
-                <a:solidFill>
-                  <a:srgbClr val="D4D4D4"/>
-                </a:solidFill>
-                <a:latin typeface="Consolas" panose="020B0609020204030204" pitchFamily="49" charset="0"/>
-              </a:rPr>
-              <a:t>).</a:t>
-            </a:r>
-            <a:r>
-              <a:rPr lang="en-US" dirty="0">
-                <a:solidFill>
-                  <a:srgbClr val="DCDCAA"/>
-                </a:solidFill>
-                <a:latin typeface="Consolas" panose="020B0609020204030204" pitchFamily="49" charset="0"/>
-              </a:rPr>
-              <a:t>html</a:t>
-            </a:r>
-            <a:r>
-              <a:rPr lang="en-US" dirty="0">
-                <a:solidFill>
-                  <a:srgbClr val="D4D4D4"/>
-                </a:solidFill>
-                <a:latin typeface="Consolas" panose="020B0609020204030204" pitchFamily="49" charset="0"/>
-              </a:rPr>
-              <a:t>(</a:t>
-            </a:r>
-            <a:r>
-              <a:rPr lang="en-US" dirty="0">
-                <a:solidFill>
-                  <a:srgbClr val="CE9178"/>
-                </a:solidFill>
-                <a:latin typeface="Consolas" panose="020B0609020204030204" pitchFamily="49" charset="0"/>
-              </a:rPr>
-              <a:t>'&lt;input class="</a:t>
-            </a:r>
-            <a:r>
-              <a:rPr lang="en-US" dirty="0" err="1">
-                <a:solidFill>
-                  <a:srgbClr val="CE9178"/>
-                </a:solidFill>
-                <a:latin typeface="Consolas" panose="020B0609020204030204" pitchFamily="49" charset="0"/>
-              </a:rPr>
-              <a:t>thVal</a:t>
-            </a:r>
-            <a:r>
-              <a:rPr lang="en-US" dirty="0">
-                <a:solidFill>
-                  <a:srgbClr val="CE9178"/>
-                </a:solidFill>
-                <a:latin typeface="Consolas" panose="020B0609020204030204" pitchFamily="49" charset="0"/>
-              </a:rPr>
-              <a:t>" type="text" value="'</a:t>
-            </a:r>
-            <a:r>
-              <a:rPr lang="en-US" dirty="0">
-                <a:solidFill>
-                  <a:srgbClr val="D4D4D4"/>
-                </a:solidFill>
-                <a:latin typeface="Consolas" panose="020B0609020204030204" pitchFamily="49" charset="0"/>
-              </a:rPr>
-              <a:t> + </a:t>
-            </a:r>
-            <a:r>
-              <a:rPr lang="en-US" dirty="0">
-                <a:solidFill>
-                  <a:srgbClr val="9CDCFE"/>
-                </a:solidFill>
-                <a:latin typeface="Consolas" panose="020B0609020204030204" pitchFamily="49" charset="0"/>
-              </a:rPr>
-              <a:t>value</a:t>
-            </a:r>
-            <a:r>
-              <a:rPr lang="en-US" dirty="0">
-                <a:solidFill>
-                  <a:srgbClr val="D4D4D4"/>
-                </a:solidFill>
-                <a:latin typeface="Consolas" panose="020B0609020204030204" pitchFamily="49" charset="0"/>
-              </a:rPr>
-              <a:t> + </a:t>
-            </a:r>
-            <a:r>
-              <a:rPr lang="en-US" dirty="0">
-                <a:solidFill>
-                  <a:srgbClr val="CE9178"/>
-                </a:solidFill>
-                <a:latin typeface="Consolas" panose="020B0609020204030204" pitchFamily="49" charset="0"/>
-              </a:rPr>
-              <a:t>'" /&gt;'</a:t>
-            </a:r>
-            <a:r>
-              <a:rPr lang="en-US" dirty="0">
-                <a:solidFill>
-                  <a:srgbClr val="D4D4D4"/>
-                </a:solidFill>
-                <a:latin typeface="Consolas" panose="020B0609020204030204" pitchFamily="49" charset="0"/>
-              </a:rPr>
-              <a:t>);</a:t>
-            </a:r>
-          </a:p>
-          <a:p>
-            <a:pPr marL="0" indent="0">
-              <a:buNone/>
-            </a:pPr>
-            <a:r>
-              <a:rPr lang="en-US" dirty="0">
-                <a:solidFill>
-                  <a:srgbClr val="D4D4D4"/>
-                </a:solidFill>
-                <a:latin typeface="Consolas" panose="020B0609020204030204" pitchFamily="49" charset="0"/>
-              </a:rPr>
-              <a:t>    </a:t>
-            </a:r>
-            <a:r>
-              <a:rPr lang="en-US" dirty="0">
-                <a:solidFill>
-                  <a:srgbClr val="DCDCAA"/>
-                </a:solidFill>
-                <a:latin typeface="Consolas" panose="020B0609020204030204" pitchFamily="49" charset="0"/>
-              </a:rPr>
-              <a:t>$</a:t>
-            </a:r>
-            <a:r>
-              <a:rPr lang="en-US" dirty="0">
-                <a:solidFill>
-                  <a:srgbClr val="D4D4D4"/>
-                </a:solidFill>
-                <a:latin typeface="Consolas" panose="020B0609020204030204" pitchFamily="49" charset="0"/>
-              </a:rPr>
-              <a:t>(</a:t>
-            </a:r>
-            <a:r>
-              <a:rPr lang="en-US" dirty="0">
-                <a:solidFill>
-                  <a:srgbClr val="CE9178"/>
-                </a:solidFill>
-                <a:latin typeface="Consolas" panose="020B0609020204030204" pitchFamily="49" charset="0"/>
-              </a:rPr>
-              <a:t>".</a:t>
-            </a:r>
-            <a:r>
-              <a:rPr lang="en-US" dirty="0" err="1">
-                <a:solidFill>
-                  <a:srgbClr val="CE9178"/>
-                </a:solidFill>
-                <a:latin typeface="Consolas" panose="020B0609020204030204" pitchFamily="49" charset="0"/>
-              </a:rPr>
-              <a:t>thVal</a:t>
-            </a:r>
-            <a:r>
-              <a:rPr lang="en-US" dirty="0">
-                <a:solidFill>
-                  <a:srgbClr val="CE9178"/>
-                </a:solidFill>
-                <a:latin typeface="Consolas" panose="020B0609020204030204" pitchFamily="49" charset="0"/>
-              </a:rPr>
-              <a:t>"</a:t>
-            </a:r>
-            <a:r>
-              <a:rPr lang="en-US" dirty="0">
-                <a:solidFill>
-                  <a:srgbClr val="D4D4D4"/>
-                </a:solidFill>
-                <a:latin typeface="Consolas" panose="020B0609020204030204" pitchFamily="49" charset="0"/>
-              </a:rPr>
-              <a:t>).</a:t>
-            </a:r>
-            <a:r>
-              <a:rPr lang="en-US" dirty="0">
-                <a:solidFill>
-                  <a:srgbClr val="DCDCAA"/>
-                </a:solidFill>
-                <a:latin typeface="Consolas" panose="020B0609020204030204" pitchFamily="49" charset="0"/>
-              </a:rPr>
-              <a:t>focus</a:t>
-            </a:r>
-            <a:r>
-              <a:rPr lang="en-US" dirty="0">
-                <a:solidFill>
-                  <a:srgbClr val="D4D4D4"/>
-                </a:solidFill>
-                <a:latin typeface="Consolas" panose="020B0609020204030204" pitchFamily="49" charset="0"/>
-              </a:rPr>
-              <a:t>();</a:t>
-            </a:r>
-          </a:p>
-          <a:p>
-            <a:pPr marL="0" indent="0">
-              <a:buNone/>
-            </a:pPr>
-            <a:r>
-              <a:rPr lang="en-US" dirty="0">
-                <a:solidFill>
-                  <a:srgbClr val="D4D4D4"/>
-                </a:solidFill>
-                <a:latin typeface="Consolas" panose="020B0609020204030204" pitchFamily="49" charset="0"/>
-              </a:rPr>
-              <a:t>    </a:t>
-            </a:r>
-            <a:r>
-              <a:rPr lang="en-US" dirty="0">
-                <a:solidFill>
-                  <a:srgbClr val="DCDCAA"/>
-                </a:solidFill>
-                <a:latin typeface="Consolas" panose="020B0609020204030204" pitchFamily="49" charset="0"/>
-              </a:rPr>
-              <a:t>$</a:t>
-            </a:r>
-            <a:r>
-              <a:rPr lang="en-US" dirty="0">
-                <a:solidFill>
-                  <a:srgbClr val="D4D4D4"/>
-                </a:solidFill>
-                <a:latin typeface="Consolas" panose="020B0609020204030204" pitchFamily="49" charset="0"/>
-              </a:rPr>
-              <a:t>(</a:t>
-            </a:r>
-            <a:r>
-              <a:rPr lang="en-US" dirty="0">
-                <a:solidFill>
-                  <a:srgbClr val="CE9178"/>
-                </a:solidFill>
-                <a:latin typeface="Consolas" panose="020B0609020204030204" pitchFamily="49" charset="0"/>
-              </a:rPr>
-              <a:t>".</a:t>
-            </a:r>
-            <a:r>
-              <a:rPr lang="en-US" dirty="0" err="1">
-                <a:solidFill>
-                  <a:srgbClr val="CE9178"/>
-                </a:solidFill>
-                <a:latin typeface="Consolas" panose="020B0609020204030204" pitchFamily="49" charset="0"/>
-              </a:rPr>
-              <a:t>thVal</a:t>
-            </a:r>
-            <a:r>
-              <a:rPr lang="en-US" dirty="0">
-                <a:solidFill>
-                  <a:srgbClr val="CE9178"/>
-                </a:solidFill>
-                <a:latin typeface="Consolas" panose="020B0609020204030204" pitchFamily="49" charset="0"/>
-              </a:rPr>
-              <a:t>"</a:t>
-            </a:r>
-            <a:r>
-              <a:rPr lang="en-US" dirty="0">
-                <a:solidFill>
-                  <a:srgbClr val="D4D4D4"/>
-                </a:solidFill>
-                <a:latin typeface="Consolas" panose="020B0609020204030204" pitchFamily="49" charset="0"/>
-              </a:rPr>
-              <a:t>).</a:t>
-            </a:r>
-            <a:r>
-              <a:rPr lang="en-US" dirty="0" err="1">
-                <a:solidFill>
-                  <a:srgbClr val="DCDCAA"/>
-                </a:solidFill>
-                <a:latin typeface="Consolas" panose="020B0609020204030204" pitchFamily="49" charset="0"/>
-              </a:rPr>
-              <a:t>keyup</a:t>
-            </a:r>
-            <a:r>
-              <a:rPr lang="en-US" dirty="0">
-                <a:solidFill>
-                  <a:srgbClr val="D4D4D4"/>
-                </a:solidFill>
-                <a:latin typeface="Consolas" panose="020B0609020204030204" pitchFamily="49" charset="0"/>
-              </a:rPr>
-              <a:t>(</a:t>
-            </a:r>
-            <a:r>
-              <a:rPr lang="en-US" dirty="0">
-                <a:solidFill>
-                  <a:srgbClr val="569CD6"/>
-                </a:solidFill>
-                <a:latin typeface="Consolas" panose="020B0609020204030204" pitchFamily="49" charset="0"/>
-              </a:rPr>
-              <a:t>function</a:t>
-            </a:r>
-            <a:r>
-              <a:rPr lang="en-US" dirty="0">
-                <a:solidFill>
-                  <a:srgbClr val="D4D4D4"/>
-                </a:solidFill>
-                <a:latin typeface="Consolas" panose="020B0609020204030204" pitchFamily="49" charset="0"/>
-              </a:rPr>
-              <a:t> (</a:t>
-            </a:r>
-            <a:r>
-              <a:rPr lang="en-US" dirty="0">
-                <a:solidFill>
-                  <a:srgbClr val="9CDCFE"/>
-                </a:solidFill>
-                <a:latin typeface="Consolas" panose="020B0609020204030204" pitchFamily="49" charset="0"/>
-              </a:rPr>
-              <a:t>event</a:t>
-            </a:r>
-            <a:r>
-              <a:rPr lang="en-US" dirty="0">
-                <a:solidFill>
-                  <a:srgbClr val="D4D4D4"/>
-                </a:solidFill>
-                <a:latin typeface="Consolas" panose="020B0609020204030204" pitchFamily="49" charset="0"/>
-              </a:rPr>
-              <a:t>) {</a:t>
-            </a:r>
-          </a:p>
-          <a:p>
-            <a:pPr marL="0" indent="0">
-              <a:buNone/>
-            </a:pPr>
-            <a:r>
-              <a:rPr lang="en-US" dirty="0">
-                <a:solidFill>
-                  <a:srgbClr val="D4D4D4"/>
-                </a:solidFill>
-                <a:latin typeface="Consolas" panose="020B0609020204030204" pitchFamily="49" charset="0"/>
-              </a:rPr>
-              <a:t>        </a:t>
-            </a:r>
-            <a:r>
-              <a:rPr lang="en-US" dirty="0">
-                <a:solidFill>
-                  <a:srgbClr val="C586C0"/>
-                </a:solidFill>
-                <a:latin typeface="Consolas" panose="020B0609020204030204" pitchFamily="49" charset="0"/>
-              </a:rPr>
-              <a:t>if</a:t>
-            </a:r>
-            <a:r>
-              <a:rPr lang="en-US" dirty="0">
-                <a:solidFill>
-                  <a:srgbClr val="D4D4D4"/>
-                </a:solidFill>
-                <a:latin typeface="Consolas" panose="020B0609020204030204" pitchFamily="49" charset="0"/>
-              </a:rPr>
-              <a:t> (</a:t>
-            </a:r>
-            <a:r>
-              <a:rPr lang="en-US" dirty="0" err="1">
-                <a:solidFill>
-                  <a:srgbClr val="9CDCFE"/>
-                </a:solidFill>
-                <a:latin typeface="Consolas" panose="020B0609020204030204" pitchFamily="49" charset="0"/>
-              </a:rPr>
-              <a:t>event</a:t>
-            </a:r>
-            <a:r>
-              <a:rPr lang="en-US" dirty="0" err="1">
-                <a:solidFill>
-                  <a:srgbClr val="D4D4D4"/>
-                </a:solidFill>
-                <a:latin typeface="Consolas" panose="020B0609020204030204" pitchFamily="49" charset="0"/>
-              </a:rPr>
-              <a:t>.</a:t>
-            </a:r>
-            <a:r>
-              <a:rPr lang="en-US" dirty="0" err="1">
-                <a:solidFill>
-                  <a:srgbClr val="9CDCFE"/>
-                </a:solidFill>
-                <a:latin typeface="Consolas" panose="020B0609020204030204" pitchFamily="49" charset="0"/>
-              </a:rPr>
-              <a:t>keyCode</a:t>
-            </a:r>
-            <a:r>
-              <a:rPr lang="en-US" dirty="0">
-                <a:solidFill>
-                  <a:srgbClr val="D4D4D4"/>
-                </a:solidFill>
-                <a:latin typeface="Consolas" panose="020B0609020204030204" pitchFamily="49" charset="0"/>
-              </a:rPr>
-              <a:t> == </a:t>
-            </a:r>
-            <a:r>
-              <a:rPr lang="en-US" dirty="0">
-                <a:solidFill>
-                  <a:srgbClr val="B5CEA8"/>
-                </a:solidFill>
-                <a:latin typeface="Consolas" panose="020B0609020204030204" pitchFamily="49" charset="0"/>
-              </a:rPr>
-              <a:t>13</a:t>
-            </a:r>
-            <a:r>
-              <a:rPr lang="en-US" dirty="0">
-                <a:solidFill>
-                  <a:srgbClr val="D4D4D4"/>
-                </a:solidFill>
-                <a:latin typeface="Consolas" panose="020B0609020204030204" pitchFamily="49" charset="0"/>
-              </a:rPr>
-              <a:t>) {</a:t>
-            </a:r>
-          </a:p>
-          <a:p>
-            <a:pPr marL="0" indent="0">
-              <a:buNone/>
-            </a:pPr>
-            <a:r>
-              <a:rPr lang="en-US" dirty="0">
-                <a:solidFill>
-                  <a:srgbClr val="D4D4D4"/>
-                </a:solidFill>
-                <a:latin typeface="Consolas" panose="020B0609020204030204" pitchFamily="49" charset="0"/>
-              </a:rPr>
-              <a:t>            </a:t>
-            </a:r>
-            <a:r>
-              <a:rPr lang="en-US" dirty="0">
-                <a:solidFill>
-                  <a:srgbClr val="DCDCAA"/>
-                </a:solidFill>
-                <a:latin typeface="Consolas" panose="020B0609020204030204" pitchFamily="49" charset="0"/>
-              </a:rPr>
-              <a:t>$</a:t>
-            </a:r>
-            <a:r>
-              <a:rPr lang="en-US" dirty="0">
-                <a:solidFill>
-                  <a:srgbClr val="D4D4D4"/>
-                </a:solidFill>
-                <a:latin typeface="Consolas" panose="020B0609020204030204" pitchFamily="49" charset="0"/>
-              </a:rPr>
-              <a:t>(</a:t>
-            </a:r>
-            <a:r>
-              <a:rPr lang="en-US" dirty="0" err="1">
-                <a:solidFill>
-                  <a:srgbClr val="9CDCFE"/>
-                </a:solidFill>
-                <a:latin typeface="Consolas" panose="020B0609020204030204" pitchFamily="49" charset="0"/>
-              </a:rPr>
-              <a:t>currentEle</a:t>
-            </a:r>
-            <a:r>
-              <a:rPr lang="en-US" dirty="0">
-                <a:solidFill>
-                  <a:srgbClr val="D4D4D4"/>
-                </a:solidFill>
-                <a:latin typeface="Consolas" panose="020B0609020204030204" pitchFamily="49" charset="0"/>
-              </a:rPr>
-              <a:t>).</a:t>
-            </a:r>
-            <a:r>
-              <a:rPr lang="en-US" dirty="0">
-                <a:solidFill>
-                  <a:srgbClr val="DCDCAA"/>
-                </a:solidFill>
-                <a:latin typeface="Consolas" panose="020B0609020204030204" pitchFamily="49" charset="0"/>
-              </a:rPr>
-              <a:t>html</a:t>
-            </a:r>
-            <a:r>
-              <a:rPr lang="en-US" dirty="0">
-                <a:solidFill>
-                  <a:srgbClr val="D4D4D4"/>
-                </a:solidFill>
-                <a:latin typeface="Consolas" panose="020B0609020204030204" pitchFamily="49" charset="0"/>
-              </a:rPr>
-              <a:t>(</a:t>
-            </a:r>
-            <a:r>
-              <a:rPr lang="en-US" dirty="0">
-                <a:solidFill>
-                  <a:srgbClr val="DCDCAA"/>
-                </a:solidFill>
-                <a:latin typeface="Consolas" panose="020B0609020204030204" pitchFamily="49" charset="0"/>
-              </a:rPr>
-              <a:t>$</a:t>
-            </a:r>
-            <a:r>
-              <a:rPr lang="en-US" dirty="0">
-                <a:solidFill>
-                  <a:srgbClr val="D4D4D4"/>
-                </a:solidFill>
-                <a:latin typeface="Consolas" panose="020B0609020204030204" pitchFamily="49" charset="0"/>
-              </a:rPr>
-              <a:t>(</a:t>
-            </a:r>
-            <a:r>
-              <a:rPr lang="en-US" dirty="0">
-                <a:solidFill>
-                  <a:srgbClr val="CE9178"/>
-                </a:solidFill>
-                <a:latin typeface="Consolas" panose="020B0609020204030204" pitchFamily="49" charset="0"/>
-              </a:rPr>
-              <a:t>".</a:t>
-            </a:r>
-            <a:r>
-              <a:rPr lang="en-US" dirty="0" err="1">
-                <a:solidFill>
-                  <a:srgbClr val="CE9178"/>
-                </a:solidFill>
-                <a:latin typeface="Consolas" panose="020B0609020204030204" pitchFamily="49" charset="0"/>
-              </a:rPr>
-              <a:t>thVal</a:t>
-            </a:r>
-            <a:r>
-              <a:rPr lang="en-US" dirty="0">
-                <a:solidFill>
-                  <a:srgbClr val="CE9178"/>
-                </a:solidFill>
-                <a:latin typeface="Consolas" panose="020B0609020204030204" pitchFamily="49" charset="0"/>
-              </a:rPr>
-              <a:t>"</a:t>
-            </a:r>
-            <a:r>
-              <a:rPr lang="en-US" dirty="0">
-                <a:solidFill>
-                  <a:srgbClr val="D4D4D4"/>
-                </a:solidFill>
-                <a:latin typeface="Consolas" panose="020B0609020204030204" pitchFamily="49" charset="0"/>
-              </a:rPr>
-              <a:t>).</a:t>
-            </a:r>
-            <a:r>
-              <a:rPr lang="en-US" dirty="0" err="1">
-                <a:solidFill>
-                  <a:srgbClr val="DCDCAA"/>
-                </a:solidFill>
-                <a:latin typeface="Consolas" panose="020B0609020204030204" pitchFamily="49" charset="0"/>
-              </a:rPr>
-              <a:t>val</a:t>
-            </a:r>
-            <a:r>
-              <a:rPr lang="en-US" dirty="0">
-                <a:solidFill>
-                  <a:srgbClr val="D4D4D4"/>
-                </a:solidFill>
-                <a:latin typeface="Consolas" panose="020B0609020204030204" pitchFamily="49" charset="0"/>
-              </a:rPr>
-              <a:t>().</a:t>
-            </a:r>
-            <a:r>
-              <a:rPr lang="en-US" dirty="0">
-                <a:solidFill>
-                  <a:srgbClr val="DCDCAA"/>
-                </a:solidFill>
-                <a:latin typeface="Consolas" panose="020B0609020204030204" pitchFamily="49" charset="0"/>
-              </a:rPr>
-              <a:t>trim</a:t>
-            </a:r>
-            <a:r>
-              <a:rPr lang="en-US" dirty="0">
-                <a:solidFill>
-                  <a:srgbClr val="D4D4D4"/>
-                </a:solidFill>
-                <a:latin typeface="Consolas" panose="020B0609020204030204" pitchFamily="49" charset="0"/>
-              </a:rPr>
-              <a:t>());</a:t>
-            </a:r>
-          </a:p>
-          <a:p>
-            <a:pPr marL="0" indent="0">
-              <a:buNone/>
-            </a:pPr>
-            <a:r>
-              <a:rPr lang="en-US" dirty="0">
-                <a:solidFill>
-                  <a:srgbClr val="D4D4D4"/>
-                </a:solidFill>
-                <a:latin typeface="Consolas" panose="020B0609020204030204" pitchFamily="49" charset="0"/>
-              </a:rPr>
-              <a:t>        }</a:t>
-            </a:r>
-          </a:p>
-          <a:p>
-            <a:pPr marL="0" indent="0">
-              <a:buNone/>
-            </a:pPr>
-            <a:r>
-              <a:rPr lang="en-US" dirty="0">
-                <a:solidFill>
-                  <a:srgbClr val="D4D4D4"/>
-                </a:solidFill>
-                <a:latin typeface="Consolas" panose="020B0609020204030204" pitchFamily="49" charset="0"/>
-              </a:rPr>
-              <a:t>    });</a:t>
-            </a:r>
-          </a:p>
-          <a:p>
-            <a:pPr marL="0" indent="0">
-              <a:buNone/>
-            </a:pPr>
-            <a:br>
-              <a:rPr lang="en-US" dirty="0">
-                <a:solidFill>
-                  <a:srgbClr val="D4D4D4"/>
-                </a:solidFill>
-                <a:latin typeface="Consolas" panose="020B0609020204030204" pitchFamily="49" charset="0"/>
-              </a:rPr>
-            </a:br>
-            <a:r>
-              <a:rPr lang="en-US" dirty="0">
-                <a:solidFill>
-                  <a:srgbClr val="D4D4D4"/>
-                </a:solidFill>
-                <a:latin typeface="Consolas" panose="020B0609020204030204" pitchFamily="49" charset="0"/>
-              </a:rPr>
-              <a:t>    </a:t>
-            </a:r>
-            <a:r>
-              <a:rPr lang="en-US" dirty="0">
-                <a:solidFill>
-                  <a:srgbClr val="DCDCAA"/>
-                </a:solidFill>
-                <a:latin typeface="Consolas" panose="020B0609020204030204" pitchFamily="49" charset="0"/>
-              </a:rPr>
-              <a:t>$</a:t>
-            </a:r>
-            <a:r>
-              <a:rPr lang="en-US" dirty="0">
-                <a:solidFill>
-                  <a:srgbClr val="D4D4D4"/>
-                </a:solidFill>
-                <a:latin typeface="Consolas" panose="020B0609020204030204" pitchFamily="49" charset="0"/>
-              </a:rPr>
-              <a:t>(</a:t>
-            </a:r>
-            <a:r>
-              <a:rPr lang="en-US" dirty="0">
-                <a:solidFill>
-                  <a:srgbClr val="9CDCFE"/>
-                </a:solidFill>
-                <a:latin typeface="Consolas" panose="020B0609020204030204" pitchFamily="49" charset="0"/>
-              </a:rPr>
-              <a:t>document</a:t>
-            </a:r>
-            <a:r>
-              <a:rPr lang="en-US" dirty="0">
-                <a:solidFill>
-                  <a:srgbClr val="D4D4D4"/>
-                </a:solidFill>
-                <a:latin typeface="Consolas" panose="020B0609020204030204" pitchFamily="49" charset="0"/>
-              </a:rPr>
-              <a:t>).</a:t>
-            </a:r>
-            <a:r>
-              <a:rPr lang="en-US" dirty="0">
-                <a:solidFill>
-                  <a:srgbClr val="DCDCAA"/>
-                </a:solidFill>
-                <a:latin typeface="Consolas" panose="020B0609020204030204" pitchFamily="49" charset="0"/>
-              </a:rPr>
-              <a:t>click</a:t>
-            </a:r>
-            <a:r>
-              <a:rPr lang="en-US" dirty="0">
-                <a:solidFill>
-                  <a:srgbClr val="D4D4D4"/>
-                </a:solidFill>
-                <a:latin typeface="Consolas" panose="020B0609020204030204" pitchFamily="49" charset="0"/>
-              </a:rPr>
-              <a:t>(</a:t>
-            </a:r>
-            <a:r>
-              <a:rPr lang="en-US" dirty="0">
-                <a:solidFill>
-                  <a:srgbClr val="569CD6"/>
-                </a:solidFill>
-                <a:latin typeface="Consolas" panose="020B0609020204030204" pitchFamily="49" charset="0"/>
-              </a:rPr>
-              <a:t>function</a:t>
-            </a:r>
-            <a:r>
-              <a:rPr lang="en-US" dirty="0">
-                <a:solidFill>
-                  <a:srgbClr val="D4D4D4"/>
-                </a:solidFill>
-                <a:latin typeface="Consolas" panose="020B0609020204030204" pitchFamily="49" charset="0"/>
-              </a:rPr>
-              <a:t> () {</a:t>
-            </a:r>
-          </a:p>
-          <a:p>
-            <a:pPr marL="0" indent="0">
-              <a:buNone/>
-            </a:pPr>
-            <a:r>
-              <a:rPr lang="en-US" dirty="0">
-                <a:solidFill>
-                  <a:srgbClr val="D4D4D4"/>
-                </a:solidFill>
-                <a:latin typeface="Consolas" panose="020B0609020204030204" pitchFamily="49" charset="0"/>
-              </a:rPr>
-              <a:t>            </a:t>
-            </a:r>
-            <a:r>
-              <a:rPr lang="en-US" dirty="0">
-                <a:solidFill>
-                  <a:srgbClr val="DCDCAA"/>
-                </a:solidFill>
-                <a:latin typeface="Consolas" panose="020B0609020204030204" pitchFamily="49" charset="0"/>
-              </a:rPr>
-              <a:t>$</a:t>
-            </a:r>
-            <a:r>
-              <a:rPr lang="en-US" dirty="0">
-                <a:solidFill>
-                  <a:srgbClr val="D4D4D4"/>
-                </a:solidFill>
-                <a:latin typeface="Consolas" panose="020B0609020204030204" pitchFamily="49" charset="0"/>
-              </a:rPr>
-              <a:t>(</a:t>
-            </a:r>
-            <a:r>
-              <a:rPr lang="en-US" dirty="0" err="1">
-                <a:solidFill>
-                  <a:srgbClr val="9CDCFE"/>
-                </a:solidFill>
-                <a:latin typeface="Consolas" panose="020B0609020204030204" pitchFamily="49" charset="0"/>
-              </a:rPr>
-              <a:t>currentEle</a:t>
-            </a:r>
-            <a:r>
-              <a:rPr lang="en-US" dirty="0">
-                <a:solidFill>
-                  <a:srgbClr val="D4D4D4"/>
-                </a:solidFill>
-                <a:latin typeface="Consolas" panose="020B0609020204030204" pitchFamily="49" charset="0"/>
-              </a:rPr>
-              <a:t>).</a:t>
-            </a:r>
-            <a:r>
-              <a:rPr lang="en-US" dirty="0">
-                <a:solidFill>
-                  <a:srgbClr val="DCDCAA"/>
-                </a:solidFill>
-                <a:latin typeface="Consolas" panose="020B0609020204030204" pitchFamily="49" charset="0"/>
-              </a:rPr>
-              <a:t>html</a:t>
-            </a:r>
-            <a:r>
-              <a:rPr lang="en-US" dirty="0">
-                <a:solidFill>
-                  <a:srgbClr val="D4D4D4"/>
-                </a:solidFill>
-                <a:latin typeface="Consolas" panose="020B0609020204030204" pitchFamily="49" charset="0"/>
-              </a:rPr>
-              <a:t>(</a:t>
-            </a:r>
-            <a:r>
-              <a:rPr lang="en-US" dirty="0">
-                <a:solidFill>
-                  <a:srgbClr val="DCDCAA"/>
-                </a:solidFill>
-                <a:latin typeface="Consolas" panose="020B0609020204030204" pitchFamily="49" charset="0"/>
-              </a:rPr>
-              <a:t>$</a:t>
-            </a:r>
-            <a:r>
-              <a:rPr lang="en-US" dirty="0">
-                <a:solidFill>
-                  <a:srgbClr val="D4D4D4"/>
-                </a:solidFill>
-                <a:latin typeface="Consolas" panose="020B0609020204030204" pitchFamily="49" charset="0"/>
-              </a:rPr>
-              <a:t>(</a:t>
-            </a:r>
-            <a:r>
-              <a:rPr lang="en-US" dirty="0">
-                <a:solidFill>
-                  <a:srgbClr val="CE9178"/>
-                </a:solidFill>
-                <a:latin typeface="Consolas" panose="020B0609020204030204" pitchFamily="49" charset="0"/>
-              </a:rPr>
-              <a:t>".</a:t>
-            </a:r>
-            <a:r>
-              <a:rPr lang="en-US" dirty="0" err="1">
-                <a:solidFill>
-                  <a:srgbClr val="CE9178"/>
-                </a:solidFill>
-                <a:latin typeface="Consolas" panose="020B0609020204030204" pitchFamily="49" charset="0"/>
-              </a:rPr>
-              <a:t>thVal</a:t>
-            </a:r>
-            <a:r>
-              <a:rPr lang="en-US" dirty="0">
-                <a:solidFill>
-                  <a:srgbClr val="CE9178"/>
-                </a:solidFill>
-                <a:latin typeface="Consolas" panose="020B0609020204030204" pitchFamily="49" charset="0"/>
-              </a:rPr>
-              <a:t>"</a:t>
-            </a:r>
-            <a:r>
-              <a:rPr lang="en-US" dirty="0">
-                <a:solidFill>
-                  <a:srgbClr val="D4D4D4"/>
-                </a:solidFill>
-                <a:latin typeface="Consolas" panose="020B0609020204030204" pitchFamily="49" charset="0"/>
-              </a:rPr>
-              <a:t>).</a:t>
-            </a:r>
-            <a:r>
-              <a:rPr lang="en-US" dirty="0" err="1">
-                <a:solidFill>
-                  <a:srgbClr val="DCDCAA"/>
-                </a:solidFill>
-                <a:latin typeface="Consolas" panose="020B0609020204030204" pitchFamily="49" charset="0"/>
-              </a:rPr>
-              <a:t>val</a:t>
-            </a:r>
-            <a:r>
-              <a:rPr lang="en-US" dirty="0">
-                <a:solidFill>
-                  <a:srgbClr val="D4D4D4"/>
-                </a:solidFill>
-                <a:latin typeface="Consolas" panose="020B0609020204030204" pitchFamily="49" charset="0"/>
-              </a:rPr>
-              <a:t>().</a:t>
-            </a:r>
-            <a:r>
-              <a:rPr lang="en-US" dirty="0">
-                <a:solidFill>
-                  <a:srgbClr val="DCDCAA"/>
-                </a:solidFill>
-                <a:latin typeface="Consolas" panose="020B0609020204030204" pitchFamily="49" charset="0"/>
-              </a:rPr>
-              <a:t>trim</a:t>
-            </a:r>
-            <a:r>
-              <a:rPr lang="en-US" dirty="0">
-                <a:solidFill>
-                  <a:srgbClr val="D4D4D4"/>
-                </a:solidFill>
-                <a:latin typeface="Consolas" panose="020B0609020204030204" pitchFamily="49" charset="0"/>
-              </a:rPr>
-              <a:t>());</a:t>
-            </a:r>
-          </a:p>
-          <a:p>
-            <a:pPr marL="0" indent="0">
-              <a:buNone/>
-            </a:pPr>
-            <a:r>
-              <a:rPr lang="en-US" dirty="0">
-                <a:solidFill>
-                  <a:srgbClr val="D4D4D4"/>
-                </a:solidFill>
-                <a:latin typeface="Consolas" panose="020B0609020204030204" pitchFamily="49" charset="0"/>
-              </a:rPr>
-              <a:t>    });</a:t>
-            </a:r>
-          </a:p>
-          <a:p>
-            <a:pPr marL="0" indent="0">
-              <a:buNone/>
-            </a:pPr>
-            <a:r>
-              <a:rPr lang="en-US" dirty="0">
-                <a:solidFill>
-                  <a:srgbClr val="D4D4D4"/>
-                </a:solidFill>
-                <a:latin typeface="Consolas" panose="020B0609020204030204" pitchFamily="49" charset="0"/>
-              </a:rPr>
-              <a:t>}</a:t>
-            </a:r>
-          </a:p>
-          <a:p>
-            <a:endParaRPr lang="en-US" dirty="0"/>
+            <a:r>
+              <a:rPr lang="en-US" dirty="0"/>
+              <a:t>Get the current value in the rating field.</a:t>
+            </a:r>
+          </a:p>
+          <a:p>
+            <a:r>
+              <a:rPr lang="en-US" dirty="0"/>
+              <a:t>Replace the current rating field with an input box.</a:t>
+            </a:r>
+          </a:p>
+          <a:p>
+            <a:r>
+              <a:rPr lang="en-US" dirty="0"/>
+              <a:t>Put the current rating value in the input box.</a:t>
+            </a:r>
+          </a:p>
+          <a:p>
+            <a:r>
+              <a:rPr lang="en-US" dirty="0"/>
+              <a:t>Set the focus to the current text box.</a:t>
+            </a:r>
           </a:p>
         </p:txBody>
       </p:sp>
     </p:spTree>
     <p:extLst>
       <p:ext uri="{BB962C8B-B14F-4D97-AF65-F5344CB8AC3E}">
-        <p14:creationId xmlns:p14="http://schemas.microsoft.com/office/powerpoint/2010/main" val="1705790773"/>
+        <p14:creationId xmlns:p14="http://schemas.microsoft.com/office/powerpoint/2010/main" val="544318707"/>
       </p:ext>
     </p:extLst>
   </p:cSld>
@@ -13536,6 +12398,1023 @@
     <p:extLst>
       <p:ext uri="{BB962C8B-B14F-4D97-AF65-F5344CB8AC3E}">
         <p14:creationId xmlns:p14="http://schemas.microsoft.com/office/powerpoint/2010/main" val="1853346653"/>
+      </p:ext>
+    </p:extLst>
+  </p:cSld>
+  <p:clrMapOvr>
+    <a:masterClrMapping/>
+  </p:clrMapOvr>
+</p:sld>
+</file>
+
+<file path=ppt/slides/slide30.xml><?xml version="1.0" encoding="utf-8"?>
+<p:sld xmlns:a="http://schemas.openxmlformats.org/drawingml/2006/main" xmlns:r="http://schemas.openxmlformats.org/officeDocument/2006/relationships" xmlns:p="http://schemas.openxmlformats.org/presentationml/2006/main">
+  <p:cSld>
+    <p:spTree>
+      <p:nvGrpSpPr>
+        <p:cNvPr id="1" name=""/>
+        <p:cNvGrpSpPr/>
+        <p:nvPr/>
+      </p:nvGrpSpPr>
+      <p:grpSpPr>
+        <a:xfrm>
+          <a:off x="0" y="0"/>
+          <a:ext cx="0" cy="0"/>
+          <a:chOff x="0" y="0"/>
+          <a:chExt cx="0" cy="0"/>
+        </a:xfrm>
+      </p:grpSpPr>
+      <p:sp>
+        <p:nvSpPr>
+          <p:cNvPr id="2" name="Title 1">
+            <a:extLst>
+              <a:ext uri="{FF2B5EF4-FFF2-40B4-BE49-F238E27FC236}">
+                <a16:creationId xmlns:a16="http://schemas.microsoft.com/office/drawing/2014/main" id="{9D0BA249-DBF2-49E1-A8B1-7446CD0D7A03}"/>
+              </a:ext>
+            </a:extLst>
+          </p:cNvPr>
+          <p:cNvSpPr>
+            <a:spLocks noGrp="1"/>
+          </p:cNvSpPr>
+          <p:nvPr>
+            <p:ph type="title"/>
+          </p:nvPr>
+        </p:nvSpPr>
+        <p:spPr>
+          <a:xfrm>
+            <a:off x="0" y="77333"/>
+            <a:ext cx="10515600" cy="603704"/>
+          </a:xfrm>
+        </p:spPr>
+        <p:txBody>
+          <a:bodyPr>
+            <a:normAutofit fontScale="90000"/>
+          </a:bodyPr>
+          <a:lstStyle/>
+          <a:p>
+            <a:r>
+              <a:rPr lang="en-US" dirty="0"/>
+              <a:t>eventhandler.js</a:t>
+            </a:r>
+          </a:p>
+        </p:txBody>
+      </p:sp>
+      <p:sp>
+        <p:nvSpPr>
+          <p:cNvPr id="6" name="Rectangle 5">
+            <a:extLst>
+              <a:ext uri="{FF2B5EF4-FFF2-40B4-BE49-F238E27FC236}">
+                <a16:creationId xmlns:a16="http://schemas.microsoft.com/office/drawing/2014/main" id="{6C20F97D-6228-487D-92EF-7C44FDA53B75}"/>
+              </a:ext>
+            </a:extLst>
+          </p:cNvPr>
+          <p:cNvSpPr/>
+          <p:nvPr/>
+        </p:nvSpPr>
+        <p:spPr>
+          <a:xfrm>
+            <a:off x="664028" y="1032026"/>
+            <a:ext cx="10613571" cy="2308324"/>
+          </a:xfrm>
+          <a:prstGeom prst="rect">
+            <a:avLst/>
+          </a:prstGeom>
+          <a:solidFill>
+            <a:schemeClr val="tx1"/>
+          </a:solidFill>
+        </p:spPr>
+        <p:txBody>
+          <a:bodyPr wrap="square">
+            <a:spAutoFit/>
+          </a:bodyPr>
+          <a:lstStyle/>
+          <a:p>
+            <a:r>
+              <a:rPr lang="en-US" dirty="0">
+                <a:solidFill>
+                  <a:srgbClr val="DCDCAA"/>
+                </a:solidFill>
+                <a:latin typeface="Consolas" panose="020B0609020204030204" pitchFamily="49" charset="0"/>
+              </a:rPr>
+              <a:t>$</a:t>
+            </a:r>
+            <a:r>
+              <a:rPr lang="en-US" dirty="0">
+                <a:solidFill>
+                  <a:srgbClr val="D4D4D4"/>
+                </a:solidFill>
+                <a:latin typeface="Consolas" panose="020B0609020204030204" pitchFamily="49" charset="0"/>
+              </a:rPr>
+              <a:t>(</a:t>
+            </a:r>
+            <a:r>
+              <a:rPr lang="en-US" dirty="0">
+                <a:solidFill>
+                  <a:srgbClr val="569CD6"/>
+                </a:solidFill>
+                <a:latin typeface="Consolas" panose="020B0609020204030204" pitchFamily="49" charset="0"/>
+              </a:rPr>
+              <a:t>function</a:t>
+            </a:r>
+            <a:r>
+              <a:rPr lang="en-US" dirty="0">
+                <a:solidFill>
+                  <a:srgbClr val="D4D4D4"/>
+                </a:solidFill>
+                <a:latin typeface="Consolas" panose="020B0609020204030204" pitchFamily="49" charset="0"/>
+              </a:rPr>
+              <a:t> () {</a:t>
+            </a:r>
+          </a:p>
+          <a:p>
+            <a:r>
+              <a:rPr lang="en-US" dirty="0">
+                <a:solidFill>
+                  <a:srgbClr val="D4D4D4"/>
+                </a:solidFill>
+                <a:latin typeface="Consolas" panose="020B0609020204030204" pitchFamily="49" charset="0"/>
+              </a:rPr>
+              <a:t>    </a:t>
+            </a:r>
+            <a:r>
+              <a:rPr lang="en-US" dirty="0">
+                <a:solidFill>
+                  <a:srgbClr val="DCDCAA"/>
+                </a:solidFill>
+                <a:latin typeface="Consolas" panose="020B0609020204030204" pitchFamily="49" charset="0"/>
+              </a:rPr>
+              <a:t>$</a:t>
+            </a:r>
+            <a:r>
+              <a:rPr lang="en-US" dirty="0">
+                <a:solidFill>
+                  <a:srgbClr val="D4D4D4"/>
+                </a:solidFill>
+                <a:latin typeface="Consolas" panose="020B0609020204030204" pitchFamily="49" charset="0"/>
+              </a:rPr>
+              <a:t>(</a:t>
+            </a:r>
+            <a:r>
+              <a:rPr lang="en-US" dirty="0">
+                <a:solidFill>
+                  <a:srgbClr val="CE9178"/>
+                </a:solidFill>
+                <a:latin typeface="Consolas" panose="020B0609020204030204" pitchFamily="49" charset="0"/>
+              </a:rPr>
+              <a:t>".</a:t>
+            </a:r>
+            <a:r>
+              <a:rPr lang="en-US" dirty="0" err="1">
+                <a:solidFill>
+                  <a:srgbClr val="CE9178"/>
+                </a:solidFill>
+                <a:latin typeface="Consolas" panose="020B0609020204030204" pitchFamily="49" charset="0"/>
+              </a:rPr>
+              <a:t>rating_cell</a:t>
+            </a:r>
+            <a:r>
+              <a:rPr lang="en-US" dirty="0">
+                <a:solidFill>
+                  <a:srgbClr val="CE9178"/>
+                </a:solidFill>
+                <a:latin typeface="Consolas" panose="020B0609020204030204" pitchFamily="49" charset="0"/>
+              </a:rPr>
+              <a:t>"</a:t>
+            </a:r>
+            <a:r>
+              <a:rPr lang="en-US" dirty="0">
+                <a:solidFill>
+                  <a:srgbClr val="D4D4D4"/>
+                </a:solidFill>
+                <a:latin typeface="Consolas" panose="020B0609020204030204" pitchFamily="49" charset="0"/>
+              </a:rPr>
+              <a:t>).</a:t>
+            </a:r>
+            <a:r>
+              <a:rPr lang="en-US" dirty="0" err="1">
+                <a:solidFill>
+                  <a:srgbClr val="DCDCAA"/>
+                </a:solidFill>
+                <a:latin typeface="Consolas" panose="020B0609020204030204" pitchFamily="49" charset="0"/>
+              </a:rPr>
+              <a:t>dblclick</a:t>
+            </a:r>
+            <a:r>
+              <a:rPr lang="en-US" dirty="0">
+                <a:solidFill>
+                  <a:srgbClr val="D4D4D4"/>
+                </a:solidFill>
+                <a:latin typeface="Consolas" panose="020B0609020204030204" pitchFamily="49" charset="0"/>
+              </a:rPr>
+              <a:t>(</a:t>
+            </a:r>
+            <a:r>
+              <a:rPr lang="en-US" dirty="0">
+                <a:solidFill>
+                  <a:srgbClr val="569CD6"/>
+                </a:solidFill>
+                <a:latin typeface="Consolas" panose="020B0609020204030204" pitchFamily="49" charset="0"/>
+              </a:rPr>
+              <a:t>function</a:t>
+            </a:r>
+            <a:r>
+              <a:rPr lang="en-US" dirty="0">
+                <a:solidFill>
+                  <a:srgbClr val="D4D4D4"/>
+                </a:solidFill>
+                <a:latin typeface="Consolas" panose="020B0609020204030204" pitchFamily="49" charset="0"/>
+              </a:rPr>
+              <a:t> (</a:t>
+            </a:r>
+            <a:r>
+              <a:rPr lang="en-US" dirty="0">
+                <a:solidFill>
+                  <a:srgbClr val="9CDCFE"/>
+                </a:solidFill>
+                <a:latin typeface="Consolas" panose="020B0609020204030204" pitchFamily="49" charset="0"/>
+              </a:rPr>
+              <a:t>e</a:t>
+            </a:r>
+            <a:r>
+              <a:rPr lang="en-US" dirty="0">
+                <a:solidFill>
+                  <a:srgbClr val="D4D4D4"/>
+                </a:solidFill>
+                <a:latin typeface="Consolas" panose="020B0609020204030204" pitchFamily="49" charset="0"/>
+              </a:rPr>
+              <a:t>) {</a:t>
+            </a:r>
+          </a:p>
+          <a:p>
+            <a:r>
+              <a:rPr lang="en-US" dirty="0">
+                <a:solidFill>
+                  <a:srgbClr val="D4D4D4"/>
+                </a:solidFill>
+                <a:latin typeface="Consolas" panose="020B0609020204030204" pitchFamily="49" charset="0"/>
+              </a:rPr>
+              <a:t>        </a:t>
+            </a:r>
+            <a:r>
+              <a:rPr lang="en-US" dirty="0" err="1">
+                <a:solidFill>
+                  <a:srgbClr val="9CDCFE"/>
+                </a:solidFill>
+                <a:latin typeface="Consolas" panose="020B0609020204030204" pitchFamily="49" charset="0"/>
+              </a:rPr>
+              <a:t>e</a:t>
+            </a:r>
+            <a:r>
+              <a:rPr lang="en-US" dirty="0" err="1">
+                <a:solidFill>
+                  <a:srgbClr val="D4D4D4"/>
+                </a:solidFill>
+                <a:latin typeface="Consolas" panose="020B0609020204030204" pitchFamily="49" charset="0"/>
+              </a:rPr>
+              <a:t>.</a:t>
+            </a:r>
+            <a:r>
+              <a:rPr lang="en-US" dirty="0" err="1">
+                <a:solidFill>
+                  <a:srgbClr val="DCDCAA"/>
+                </a:solidFill>
+                <a:latin typeface="Consolas" panose="020B0609020204030204" pitchFamily="49" charset="0"/>
+              </a:rPr>
+              <a:t>stopPropagation</a:t>
+            </a:r>
+            <a:r>
+              <a:rPr lang="en-US" dirty="0">
+                <a:solidFill>
+                  <a:srgbClr val="D4D4D4"/>
+                </a:solidFill>
+                <a:latin typeface="Consolas" panose="020B0609020204030204" pitchFamily="49" charset="0"/>
+              </a:rPr>
+              <a:t>();</a:t>
+            </a:r>
+          </a:p>
+          <a:p>
+            <a:r>
+              <a:rPr lang="en-US" dirty="0">
+                <a:solidFill>
+                  <a:srgbClr val="D4D4D4"/>
+                </a:solidFill>
+                <a:latin typeface="Consolas" panose="020B0609020204030204" pitchFamily="49" charset="0"/>
+              </a:rPr>
+              <a:t>        </a:t>
+            </a:r>
+            <a:r>
+              <a:rPr lang="en-US" dirty="0">
+                <a:solidFill>
+                  <a:srgbClr val="569CD6"/>
+                </a:solidFill>
+                <a:latin typeface="Consolas" panose="020B0609020204030204" pitchFamily="49" charset="0"/>
+              </a:rPr>
+              <a:t>var</a:t>
+            </a:r>
+            <a:r>
+              <a:rPr lang="en-US" dirty="0">
+                <a:solidFill>
+                  <a:srgbClr val="D4D4D4"/>
+                </a:solidFill>
+                <a:latin typeface="Consolas" panose="020B0609020204030204" pitchFamily="49" charset="0"/>
+              </a:rPr>
+              <a:t> </a:t>
+            </a:r>
+            <a:r>
+              <a:rPr lang="en-US" dirty="0" err="1">
+                <a:solidFill>
+                  <a:srgbClr val="9CDCFE"/>
+                </a:solidFill>
+                <a:latin typeface="Consolas" panose="020B0609020204030204" pitchFamily="49" charset="0"/>
+              </a:rPr>
+              <a:t>currentEle</a:t>
+            </a:r>
+            <a:r>
+              <a:rPr lang="en-US" dirty="0">
+                <a:solidFill>
+                  <a:srgbClr val="D4D4D4"/>
+                </a:solidFill>
+                <a:latin typeface="Consolas" panose="020B0609020204030204" pitchFamily="49" charset="0"/>
+              </a:rPr>
+              <a:t> = </a:t>
+            </a:r>
+            <a:r>
+              <a:rPr lang="en-US" dirty="0">
+                <a:solidFill>
+                  <a:srgbClr val="DCDCAA"/>
+                </a:solidFill>
+                <a:latin typeface="Consolas" panose="020B0609020204030204" pitchFamily="49" charset="0"/>
+              </a:rPr>
+              <a:t>$</a:t>
+            </a:r>
+            <a:r>
+              <a:rPr lang="en-US" dirty="0">
+                <a:solidFill>
+                  <a:srgbClr val="D4D4D4"/>
+                </a:solidFill>
+                <a:latin typeface="Consolas" panose="020B0609020204030204" pitchFamily="49" charset="0"/>
+              </a:rPr>
+              <a:t>(</a:t>
+            </a:r>
+            <a:r>
+              <a:rPr lang="en-US" dirty="0">
+                <a:solidFill>
+                  <a:srgbClr val="569CD6"/>
+                </a:solidFill>
+                <a:latin typeface="Consolas" panose="020B0609020204030204" pitchFamily="49" charset="0"/>
+              </a:rPr>
+              <a:t>this</a:t>
+            </a:r>
+            <a:r>
+              <a:rPr lang="en-US" dirty="0">
+                <a:solidFill>
+                  <a:srgbClr val="D4D4D4"/>
+                </a:solidFill>
+                <a:latin typeface="Consolas" panose="020B0609020204030204" pitchFamily="49" charset="0"/>
+              </a:rPr>
+              <a:t>);</a:t>
+            </a:r>
+          </a:p>
+          <a:p>
+            <a:r>
+              <a:rPr lang="en-US" dirty="0">
+                <a:solidFill>
+                  <a:srgbClr val="D4D4D4"/>
+                </a:solidFill>
+                <a:latin typeface="Consolas" panose="020B0609020204030204" pitchFamily="49" charset="0"/>
+              </a:rPr>
+              <a:t>        </a:t>
+            </a:r>
+            <a:r>
+              <a:rPr lang="en-US" dirty="0">
+                <a:solidFill>
+                  <a:srgbClr val="569CD6"/>
+                </a:solidFill>
+                <a:latin typeface="Consolas" panose="020B0609020204030204" pitchFamily="49" charset="0"/>
+              </a:rPr>
+              <a:t>var</a:t>
+            </a:r>
+            <a:r>
+              <a:rPr lang="en-US" dirty="0">
+                <a:solidFill>
+                  <a:srgbClr val="D4D4D4"/>
+                </a:solidFill>
+                <a:latin typeface="Consolas" panose="020B0609020204030204" pitchFamily="49" charset="0"/>
+              </a:rPr>
+              <a:t> </a:t>
+            </a:r>
+            <a:r>
+              <a:rPr lang="en-US" dirty="0">
+                <a:solidFill>
+                  <a:srgbClr val="9CDCFE"/>
+                </a:solidFill>
+                <a:latin typeface="Consolas" panose="020B0609020204030204" pitchFamily="49" charset="0"/>
+              </a:rPr>
+              <a:t>value</a:t>
+            </a:r>
+            <a:r>
+              <a:rPr lang="en-US" dirty="0">
+                <a:solidFill>
+                  <a:srgbClr val="D4D4D4"/>
+                </a:solidFill>
+                <a:latin typeface="Consolas" panose="020B0609020204030204" pitchFamily="49" charset="0"/>
+              </a:rPr>
+              <a:t> = </a:t>
+            </a:r>
+            <a:r>
+              <a:rPr lang="en-US" dirty="0">
+                <a:solidFill>
+                  <a:srgbClr val="DCDCAA"/>
+                </a:solidFill>
+                <a:latin typeface="Consolas" panose="020B0609020204030204" pitchFamily="49" charset="0"/>
+              </a:rPr>
+              <a:t>$</a:t>
+            </a:r>
+            <a:r>
+              <a:rPr lang="en-US" dirty="0">
+                <a:solidFill>
+                  <a:srgbClr val="D4D4D4"/>
+                </a:solidFill>
+                <a:latin typeface="Consolas" panose="020B0609020204030204" pitchFamily="49" charset="0"/>
+              </a:rPr>
+              <a:t>(</a:t>
+            </a:r>
+            <a:r>
+              <a:rPr lang="en-US" dirty="0">
+                <a:solidFill>
+                  <a:srgbClr val="569CD6"/>
+                </a:solidFill>
+                <a:latin typeface="Consolas" panose="020B0609020204030204" pitchFamily="49" charset="0"/>
+              </a:rPr>
+              <a:t>this</a:t>
+            </a:r>
+            <a:r>
+              <a:rPr lang="en-US" dirty="0">
+                <a:solidFill>
+                  <a:srgbClr val="D4D4D4"/>
+                </a:solidFill>
+                <a:latin typeface="Consolas" panose="020B0609020204030204" pitchFamily="49" charset="0"/>
+              </a:rPr>
+              <a:t>).</a:t>
+            </a:r>
+            <a:r>
+              <a:rPr lang="en-US" dirty="0">
+                <a:solidFill>
+                  <a:srgbClr val="DCDCAA"/>
+                </a:solidFill>
+                <a:latin typeface="Consolas" panose="020B0609020204030204" pitchFamily="49" charset="0"/>
+              </a:rPr>
+              <a:t>html</a:t>
+            </a:r>
+            <a:r>
+              <a:rPr lang="en-US" dirty="0">
+                <a:solidFill>
+                  <a:srgbClr val="D4D4D4"/>
+                </a:solidFill>
+                <a:latin typeface="Consolas" panose="020B0609020204030204" pitchFamily="49" charset="0"/>
+              </a:rPr>
+              <a:t>();</a:t>
+            </a:r>
+          </a:p>
+          <a:p>
+            <a:r>
+              <a:rPr lang="en-US" dirty="0">
+                <a:solidFill>
+                  <a:srgbClr val="D4D4D4"/>
+                </a:solidFill>
+                <a:latin typeface="Consolas" panose="020B0609020204030204" pitchFamily="49" charset="0"/>
+              </a:rPr>
+              <a:t>        </a:t>
+            </a:r>
+            <a:r>
+              <a:rPr lang="en-US" dirty="0" err="1">
+                <a:solidFill>
+                  <a:srgbClr val="DCDCAA"/>
+                </a:solidFill>
+                <a:latin typeface="Consolas" panose="020B0609020204030204" pitchFamily="49" charset="0"/>
+              </a:rPr>
+              <a:t>changeCurrentElementToInputBox</a:t>
+            </a:r>
+            <a:r>
+              <a:rPr lang="en-US" dirty="0">
+                <a:solidFill>
+                  <a:srgbClr val="D4D4D4"/>
+                </a:solidFill>
+                <a:latin typeface="Consolas" panose="020B0609020204030204" pitchFamily="49" charset="0"/>
+              </a:rPr>
+              <a:t>(</a:t>
+            </a:r>
+            <a:r>
+              <a:rPr lang="en-US" dirty="0" err="1">
+                <a:solidFill>
+                  <a:srgbClr val="9CDCFE"/>
+                </a:solidFill>
+                <a:latin typeface="Consolas" panose="020B0609020204030204" pitchFamily="49" charset="0"/>
+              </a:rPr>
+              <a:t>currentEle</a:t>
+            </a:r>
+            <a:r>
+              <a:rPr lang="en-US" dirty="0" err="1">
+                <a:solidFill>
+                  <a:srgbClr val="D4D4D4"/>
+                </a:solidFill>
+                <a:latin typeface="Consolas" panose="020B0609020204030204" pitchFamily="49" charset="0"/>
+              </a:rPr>
+              <a:t>,</a:t>
+            </a:r>
+            <a:r>
+              <a:rPr lang="en-US" dirty="0" err="1">
+                <a:solidFill>
+                  <a:srgbClr val="9CDCFE"/>
+                </a:solidFill>
+                <a:latin typeface="Consolas" panose="020B0609020204030204" pitchFamily="49" charset="0"/>
+              </a:rPr>
+              <a:t>value</a:t>
+            </a:r>
+            <a:r>
+              <a:rPr lang="en-US" dirty="0">
+                <a:solidFill>
+                  <a:srgbClr val="D4D4D4"/>
+                </a:solidFill>
+                <a:latin typeface="Consolas" panose="020B0609020204030204" pitchFamily="49" charset="0"/>
+              </a:rPr>
+              <a:t>);</a:t>
+            </a:r>
+          </a:p>
+          <a:p>
+            <a:r>
+              <a:rPr lang="en-US" dirty="0">
+                <a:solidFill>
+                  <a:srgbClr val="D4D4D4"/>
+                </a:solidFill>
+                <a:latin typeface="Consolas" panose="020B0609020204030204" pitchFamily="49" charset="0"/>
+              </a:rPr>
+              <a:t>    });</a:t>
+            </a:r>
+          </a:p>
+          <a:p>
+            <a:r>
+              <a:rPr lang="en-US" dirty="0">
+                <a:solidFill>
+                  <a:srgbClr val="D4D4D4"/>
+                </a:solidFill>
+                <a:latin typeface="Consolas" panose="020B0609020204030204" pitchFamily="49" charset="0"/>
+              </a:rPr>
+              <a:t>});</a:t>
+            </a:r>
+          </a:p>
+        </p:txBody>
+      </p:sp>
+      <p:sp>
+        <p:nvSpPr>
+          <p:cNvPr id="7" name="Rectangle 6">
+            <a:extLst>
+              <a:ext uri="{FF2B5EF4-FFF2-40B4-BE49-F238E27FC236}">
+                <a16:creationId xmlns:a16="http://schemas.microsoft.com/office/drawing/2014/main" id="{6CDD7D4A-DBFE-4672-BE0F-6C80BBFA832C}"/>
+              </a:ext>
+            </a:extLst>
+          </p:cNvPr>
+          <p:cNvSpPr/>
+          <p:nvPr/>
+        </p:nvSpPr>
+        <p:spPr>
+          <a:xfrm>
+            <a:off x="664027" y="3794649"/>
+            <a:ext cx="10613571" cy="1477328"/>
+          </a:xfrm>
+          <a:prstGeom prst="rect">
+            <a:avLst/>
+          </a:prstGeom>
+          <a:solidFill>
+            <a:schemeClr val="tx1"/>
+          </a:solidFill>
+        </p:spPr>
+        <p:txBody>
+          <a:bodyPr wrap="square">
+            <a:spAutoFit/>
+          </a:bodyPr>
+          <a:lstStyle/>
+          <a:p>
+            <a:r>
+              <a:rPr lang="en-US" dirty="0">
+                <a:solidFill>
+                  <a:srgbClr val="569CD6"/>
+                </a:solidFill>
+                <a:latin typeface="Consolas" panose="020B0609020204030204" pitchFamily="49" charset="0"/>
+              </a:rPr>
+              <a:t>function</a:t>
+            </a:r>
+            <a:r>
+              <a:rPr lang="en-US" dirty="0">
+                <a:solidFill>
+                  <a:srgbClr val="D4D4D4"/>
+                </a:solidFill>
+                <a:latin typeface="Consolas" panose="020B0609020204030204" pitchFamily="49" charset="0"/>
+              </a:rPr>
+              <a:t> </a:t>
+            </a:r>
+            <a:r>
+              <a:rPr lang="en-US" dirty="0" err="1">
+                <a:solidFill>
+                  <a:srgbClr val="DCDCAA"/>
+                </a:solidFill>
+                <a:latin typeface="Consolas" panose="020B0609020204030204" pitchFamily="49" charset="0"/>
+              </a:rPr>
+              <a:t>changeCurrentElementToInputBox</a:t>
+            </a:r>
+            <a:r>
+              <a:rPr lang="en-US" dirty="0">
+                <a:solidFill>
+                  <a:srgbClr val="D4D4D4"/>
+                </a:solidFill>
+                <a:latin typeface="Consolas" panose="020B0609020204030204" pitchFamily="49" charset="0"/>
+              </a:rPr>
+              <a:t>(</a:t>
+            </a:r>
+            <a:r>
+              <a:rPr lang="en-US" dirty="0">
+                <a:solidFill>
+                  <a:srgbClr val="9CDCFE"/>
+                </a:solidFill>
+                <a:latin typeface="Consolas" panose="020B0609020204030204" pitchFamily="49" charset="0"/>
+              </a:rPr>
+              <a:t>el</a:t>
+            </a:r>
+            <a:r>
+              <a:rPr lang="en-US" dirty="0">
+                <a:solidFill>
+                  <a:srgbClr val="D4D4D4"/>
+                </a:solidFill>
+                <a:latin typeface="Consolas" panose="020B0609020204030204" pitchFamily="49" charset="0"/>
+              </a:rPr>
+              <a:t>, </a:t>
+            </a:r>
+            <a:r>
+              <a:rPr lang="en-US" dirty="0">
+                <a:solidFill>
+                  <a:srgbClr val="9CDCFE"/>
+                </a:solidFill>
+                <a:latin typeface="Consolas" panose="020B0609020204030204" pitchFamily="49" charset="0"/>
+              </a:rPr>
+              <a:t>value</a:t>
+            </a:r>
+            <a:r>
+              <a:rPr lang="en-US" dirty="0">
+                <a:solidFill>
+                  <a:srgbClr val="D4D4D4"/>
+                </a:solidFill>
+                <a:latin typeface="Consolas" panose="020B0609020204030204" pitchFamily="49" charset="0"/>
+              </a:rPr>
+              <a:t>)</a:t>
+            </a:r>
+          </a:p>
+          <a:p>
+            <a:r>
+              <a:rPr lang="en-US" dirty="0">
+                <a:solidFill>
+                  <a:srgbClr val="D4D4D4"/>
+                </a:solidFill>
+                <a:latin typeface="Consolas" panose="020B0609020204030204" pitchFamily="49" charset="0"/>
+              </a:rPr>
+              <a:t>{</a:t>
+            </a:r>
+          </a:p>
+          <a:p>
+            <a:r>
+              <a:rPr lang="en-US" dirty="0">
+                <a:solidFill>
+                  <a:srgbClr val="D4D4D4"/>
+                </a:solidFill>
+                <a:latin typeface="Consolas" panose="020B0609020204030204" pitchFamily="49" charset="0"/>
+              </a:rPr>
+              <a:t>    </a:t>
+            </a:r>
+            <a:r>
+              <a:rPr lang="en-US" dirty="0">
+                <a:solidFill>
+                  <a:srgbClr val="DCDCAA"/>
+                </a:solidFill>
+                <a:latin typeface="Consolas" panose="020B0609020204030204" pitchFamily="49" charset="0"/>
+              </a:rPr>
+              <a:t>$</a:t>
+            </a:r>
+            <a:r>
+              <a:rPr lang="en-US" dirty="0">
+                <a:solidFill>
+                  <a:srgbClr val="D4D4D4"/>
+                </a:solidFill>
+                <a:latin typeface="Consolas" panose="020B0609020204030204" pitchFamily="49" charset="0"/>
+              </a:rPr>
+              <a:t>(</a:t>
+            </a:r>
+            <a:r>
+              <a:rPr lang="en-US" dirty="0">
+                <a:solidFill>
+                  <a:srgbClr val="9CDCFE"/>
+                </a:solidFill>
+                <a:latin typeface="Consolas" panose="020B0609020204030204" pitchFamily="49" charset="0"/>
+              </a:rPr>
+              <a:t>el</a:t>
+            </a:r>
+            <a:r>
+              <a:rPr lang="en-US" dirty="0">
+                <a:solidFill>
+                  <a:srgbClr val="D4D4D4"/>
+                </a:solidFill>
+                <a:latin typeface="Consolas" panose="020B0609020204030204" pitchFamily="49" charset="0"/>
+              </a:rPr>
+              <a:t>).</a:t>
+            </a:r>
+            <a:r>
+              <a:rPr lang="en-US" dirty="0">
+                <a:solidFill>
+                  <a:srgbClr val="DCDCAA"/>
+                </a:solidFill>
+                <a:latin typeface="Consolas" panose="020B0609020204030204" pitchFamily="49" charset="0"/>
+              </a:rPr>
+              <a:t>html</a:t>
+            </a:r>
+            <a:r>
+              <a:rPr lang="en-US" dirty="0">
+                <a:solidFill>
+                  <a:srgbClr val="D4D4D4"/>
+                </a:solidFill>
+                <a:latin typeface="Consolas" panose="020B0609020204030204" pitchFamily="49" charset="0"/>
+              </a:rPr>
+              <a:t>(</a:t>
+            </a:r>
+            <a:r>
+              <a:rPr lang="en-US" dirty="0">
+                <a:solidFill>
+                  <a:srgbClr val="CE9178"/>
+                </a:solidFill>
+                <a:latin typeface="Consolas" panose="020B0609020204030204" pitchFamily="49" charset="0"/>
+              </a:rPr>
+              <a:t>'&lt;input class="</a:t>
+            </a:r>
+            <a:r>
+              <a:rPr lang="en-US" dirty="0" err="1">
+                <a:solidFill>
+                  <a:srgbClr val="CE9178"/>
+                </a:solidFill>
+                <a:latin typeface="Consolas" panose="020B0609020204030204" pitchFamily="49" charset="0"/>
+              </a:rPr>
+              <a:t>txtInput</a:t>
+            </a:r>
+            <a:r>
+              <a:rPr lang="en-US" dirty="0">
+                <a:solidFill>
+                  <a:srgbClr val="CE9178"/>
+                </a:solidFill>
+                <a:latin typeface="Consolas" panose="020B0609020204030204" pitchFamily="49" charset="0"/>
+              </a:rPr>
+              <a:t>" type="text" value='</a:t>
+            </a:r>
+            <a:r>
+              <a:rPr lang="en-US" dirty="0">
+                <a:solidFill>
+                  <a:srgbClr val="D4D4D4"/>
+                </a:solidFill>
+                <a:latin typeface="Consolas" panose="020B0609020204030204" pitchFamily="49" charset="0"/>
+              </a:rPr>
+              <a:t> + </a:t>
+            </a:r>
+            <a:r>
+              <a:rPr lang="en-US" dirty="0">
+                <a:solidFill>
+                  <a:srgbClr val="9CDCFE"/>
+                </a:solidFill>
+                <a:latin typeface="Consolas" panose="020B0609020204030204" pitchFamily="49" charset="0"/>
+              </a:rPr>
+              <a:t>value</a:t>
+            </a:r>
+            <a:r>
+              <a:rPr lang="en-US" dirty="0">
+                <a:solidFill>
+                  <a:srgbClr val="D4D4D4"/>
+                </a:solidFill>
+                <a:latin typeface="Consolas" panose="020B0609020204030204" pitchFamily="49" charset="0"/>
+              </a:rPr>
+              <a:t> + </a:t>
+            </a:r>
+            <a:r>
+              <a:rPr lang="en-US" dirty="0">
+                <a:solidFill>
+                  <a:srgbClr val="CE9178"/>
+                </a:solidFill>
+                <a:latin typeface="Consolas" panose="020B0609020204030204" pitchFamily="49" charset="0"/>
+              </a:rPr>
+              <a:t>'"/&gt;'</a:t>
+            </a:r>
+            <a:r>
+              <a:rPr lang="en-US" dirty="0">
+                <a:solidFill>
+                  <a:srgbClr val="D4D4D4"/>
+                </a:solidFill>
+                <a:latin typeface="Consolas" panose="020B0609020204030204" pitchFamily="49" charset="0"/>
+              </a:rPr>
+              <a:t>);</a:t>
+            </a:r>
+          </a:p>
+          <a:p>
+            <a:r>
+              <a:rPr lang="en-US" dirty="0">
+                <a:solidFill>
+                  <a:srgbClr val="D4D4D4"/>
+                </a:solidFill>
+                <a:latin typeface="Consolas" panose="020B0609020204030204" pitchFamily="49" charset="0"/>
+              </a:rPr>
+              <a:t>    </a:t>
+            </a:r>
+            <a:r>
+              <a:rPr lang="en-US" dirty="0">
+                <a:solidFill>
+                  <a:srgbClr val="DCDCAA"/>
+                </a:solidFill>
+                <a:latin typeface="Consolas" panose="020B0609020204030204" pitchFamily="49" charset="0"/>
+              </a:rPr>
+              <a:t>$</a:t>
+            </a:r>
+            <a:r>
+              <a:rPr lang="en-US" dirty="0">
+                <a:solidFill>
+                  <a:srgbClr val="D4D4D4"/>
+                </a:solidFill>
+                <a:latin typeface="Consolas" panose="020B0609020204030204" pitchFamily="49" charset="0"/>
+              </a:rPr>
+              <a:t>(</a:t>
+            </a:r>
+            <a:r>
+              <a:rPr lang="en-US" dirty="0">
+                <a:solidFill>
+                  <a:srgbClr val="CE9178"/>
+                </a:solidFill>
+                <a:latin typeface="Consolas" panose="020B0609020204030204" pitchFamily="49" charset="0"/>
+              </a:rPr>
+              <a:t>".</a:t>
+            </a:r>
+            <a:r>
+              <a:rPr lang="en-US" dirty="0" err="1">
+                <a:solidFill>
+                  <a:srgbClr val="CE9178"/>
+                </a:solidFill>
+                <a:latin typeface="Consolas" panose="020B0609020204030204" pitchFamily="49" charset="0"/>
+              </a:rPr>
+              <a:t>txtInput</a:t>
+            </a:r>
+            <a:r>
+              <a:rPr lang="en-US" dirty="0">
+                <a:solidFill>
+                  <a:srgbClr val="CE9178"/>
+                </a:solidFill>
+                <a:latin typeface="Consolas" panose="020B0609020204030204" pitchFamily="49" charset="0"/>
+              </a:rPr>
+              <a:t>"</a:t>
+            </a:r>
+            <a:r>
+              <a:rPr lang="en-US" dirty="0">
+                <a:solidFill>
+                  <a:srgbClr val="D4D4D4"/>
+                </a:solidFill>
+                <a:latin typeface="Consolas" panose="020B0609020204030204" pitchFamily="49" charset="0"/>
+              </a:rPr>
+              <a:t>).</a:t>
+            </a:r>
+            <a:r>
+              <a:rPr lang="en-US" dirty="0">
+                <a:solidFill>
+                  <a:srgbClr val="DCDCAA"/>
+                </a:solidFill>
+                <a:latin typeface="Consolas" panose="020B0609020204030204" pitchFamily="49" charset="0"/>
+              </a:rPr>
+              <a:t>focus</a:t>
+            </a:r>
+            <a:r>
+              <a:rPr lang="en-US" dirty="0">
+                <a:solidFill>
+                  <a:srgbClr val="D4D4D4"/>
+                </a:solidFill>
+                <a:latin typeface="Consolas" panose="020B0609020204030204" pitchFamily="49" charset="0"/>
+              </a:rPr>
+              <a:t>();</a:t>
+            </a:r>
+          </a:p>
+          <a:p>
+            <a:r>
+              <a:rPr lang="en-US" dirty="0">
+                <a:solidFill>
+                  <a:srgbClr val="D4D4D4"/>
+                </a:solidFill>
+                <a:latin typeface="Consolas" panose="020B0609020204030204" pitchFamily="49" charset="0"/>
+              </a:rPr>
+              <a:t>}</a:t>
+            </a:r>
+            <a:endParaRPr lang="en-US" b="0" dirty="0">
+              <a:solidFill>
+                <a:srgbClr val="D4D4D4"/>
+              </a:solidFill>
+              <a:effectLst/>
+              <a:latin typeface="Consolas" panose="020B0609020204030204" pitchFamily="49" charset="0"/>
+            </a:endParaRPr>
+          </a:p>
+        </p:txBody>
+      </p:sp>
+    </p:spTree>
+    <p:extLst>
+      <p:ext uri="{BB962C8B-B14F-4D97-AF65-F5344CB8AC3E}">
+        <p14:creationId xmlns:p14="http://schemas.microsoft.com/office/powerpoint/2010/main" val="1705790773"/>
+      </p:ext>
+    </p:extLst>
+  </p:cSld>
+  <p:clrMapOvr>
+    <a:masterClrMapping/>
+  </p:clrMapOvr>
+</p:sld>
+</file>
+
+<file path=ppt/slides/slide31.xml><?xml version="1.0" encoding="utf-8"?>
+<p:sld xmlns:a="http://schemas.openxmlformats.org/drawingml/2006/main" xmlns:r="http://schemas.openxmlformats.org/officeDocument/2006/relationships" xmlns:p="http://schemas.openxmlformats.org/presentationml/2006/main">
+  <p:cSld>
+    <p:spTree>
+      <p:nvGrpSpPr>
+        <p:cNvPr id="1" name=""/>
+        <p:cNvGrpSpPr/>
+        <p:nvPr/>
+      </p:nvGrpSpPr>
+      <p:grpSpPr>
+        <a:xfrm>
+          <a:off x="0" y="0"/>
+          <a:ext cx="0" cy="0"/>
+          <a:chOff x="0" y="0"/>
+          <a:chExt cx="0" cy="0"/>
+        </a:xfrm>
+      </p:grpSpPr>
+      <p:sp>
+        <p:nvSpPr>
+          <p:cNvPr id="2" name="Title 1">
+            <a:extLst>
+              <a:ext uri="{FF2B5EF4-FFF2-40B4-BE49-F238E27FC236}">
+                <a16:creationId xmlns:a16="http://schemas.microsoft.com/office/drawing/2014/main" id="{0BDA4907-E0F4-4674-A38F-D2D28186FC4E}"/>
+              </a:ext>
+            </a:extLst>
+          </p:cNvPr>
+          <p:cNvSpPr>
+            <a:spLocks noGrp="1"/>
+          </p:cNvSpPr>
+          <p:nvPr>
+            <p:ph type="title"/>
+          </p:nvPr>
+        </p:nvSpPr>
+        <p:spPr/>
+        <p:txBody>
+          <a:bodyPr/>
+          <a:lstStyle/>
+          <a:p>
+            <a:r>
+              <a:rPr lang="en-US" dirty="0"/>
+              <a:t>eventhandler.js</a:t>
+            </a:r>
+          </a:p>
+        </p:txBody>
+      </p:sp>
+      <p:sp>
+        <p:nvSpPr>
+          <p:cNvPr id="3" name="Content Placeholder 2">
+            <a:extLst>
+              <a:ext uri="{FF2B5EF4-FFF2-40B4-BE49-F238E27FC236}">
+                <a16:creationId xmlns:a16="http://schemas.microsoft.com/office/drawing/2014/main" id="{FC085861-025F-419C-B008-62BEFB3F5DC7}"/>
+              </a:ext>
+            </a:extLst>
+          </p:cNvPr>
+          <p:cNvSpPr>
+            <a:spLocks noGrp="1"/>
+          </p:cNvSpPr>
+          <p:nvPr>
+            <p:ph idx="1"/>
+          </p:nvPr>
+        </p:nvSpPr>
+        <p:spPr/>
+        <p:txBody>
+          <a:bodyPr/>
+          <a:lstStyle/>
+          <a:p>
+            <a:r>
+              <a:rPr lang="en-US" dirty="0"/>
+              <a:t>If the user hits enter, replace the input box with the value in input box.</a:t>
+            </a:r>
+          </a:p>
+          <a:p>
+            <a:r>
+              <a:rPr lang="en-US" dirty="0"/>
+              <a:t>If the user clicks anywhere in the document, replace the input box with the value in input box.</a:t>
+            </a:r>
+          </a:p>
+        </p:txBody>
+      </p:sp>
+    </p:spTree>
+    <p:extLst>
+      <p:ext uri="{BB962C8B-B14F-4D97-AF65-F5344CB8AC3E}">
+        <p14:creationId xmlns:p14="http://schemas.microsoft.com/office/powerpoint/2010/main" val="4232136657"/>
       </p:ext>
     </p:extLst>
   </p:cSld>

</xml_diff>